<commit_message>
Se corrigen errores de los dos primero cuadernos
</commit_message>
<xml_diff>
--- a/01 Introduccion a las redes neuronales/Imagenes/Figuras.pptx
+++ b/01 Introduccion a las redes neuronales/Imagenes/Figuras.pptx
@@ -6,6 +6,7 @@
   </p:sldMasterIdLst>
   <p:sldIdLst>
     <p:sldId id="257" r:id="rId2"/>
+    <p:sldId id="258" r:id="rId3"/>
   </p:sldIdLst>
   <p:sldSz cx="12192000" cy="6858000"/>
   <p:notesSz cx="6858000" cy="9144000"/>
@@ -104,6 +105,11 @@
       </a:defRPr>
     </a:lvl9pPr>
   </p:defaultTextStyle>
+  <p:extLst>
+    <p:ext uri="{EFAFB233-063F-42B5-8137-9DF3F51BA10A}">
+      <p15:sldGuideLst xmlns:p15="http://schemas.microsoft.com/office/powerpoint/2012/main"/>
+    </p:ext>
+  </p:extLst>
 </p:presentation>
 </file>
 
@@ -254,7 +260,7 @@
           <a:p>
             <a:fld id="{DF4DFADA-E375-40DE-968A-CBEA23AA7149}" type="datetimeFigureOut">
               <a:rPr lang="es-ES" smtClean="0"/>
-              <a:t>21/01/2022</a:t>
+              <a:t>15/02/2022</a:t>
             </a:fld>
             <a:endParaRPr lang="es-ES"/>
           </a:p>
@@ -452,7 +458,7 @@
           <a:p>
             <a:fld id="{DF4DFADA-E375-40DE-968A-CBEA23AA7149}" type="datetimeFigureOut">
               <a:rPr lang="es-ES" smtClean="0"/>
-              <a:t>21/01/2022</a:t>
+              <a:t>15/02/2022</a:t>
             </a:fld>
             <a:endParaRPr lang="es-ES"/>
           </a:p>
@@ -660,7 +666,7 @@
           <a:p>
             <a:fld id="{DF4DFADA-E375-40DE-968A-CBEA23AA7149}" type="datetimeFigureOut">
               <a:rPr lang="es-ES" smtClean="0"/>
-              <a:t>21/01/2022</a:t>
+              <a:t>15/02/2022</a:t>
             </a:fld>
             <a:endParaRPr lang="es-ES"/>
           </a:p>
@@ -858,7 +864,7 @@
           <a:p>
             <a:fld id="{DF4DFADA-E375-40DE-968A-CBEA23AA7149}" type="datetimeFigureOut">
               <a:rPr lang="es-ES" smtClean="0"/>
-              <a:t>21/01/2022</a:t>
+              <a:t>15/02/2022</a:t>
             </a:fld>
             <a:endParaRPr lang="es-ES"/>
           </a:p>
@@ -1133,7 +1139,7 @@
           <a:p>
             <a:fld id="{DF4DFADA-E375-40DE-968A-CBEA23AA7149}" type="datetimeFigureOut">
               <a:rPr lang="es-ES" smtClean="0"/>
-              <a:t>21/01/2022</a:t>
+              <a:t>15/02/2022</a:t>
             </a:fld>
             <a:endParaRPr lang="es-ES"/>
           </a:p>
@@ -1398,7 +1404,7 @@
           <a:p>
             <a:fld id="{DF4DFADA-E375-40DE-968A-CBEA23AA7149}" type="datetimeFigureOut">
               <a:rPr lang="es-ES" smtClean="0"/>
-              <a:t>21/01/2022</a:t>
+              <a:t>15/02/2022</a:t>
             </a:fld>
             <a:endParaRPr lang="es-ES"/>
           </a:p>
@@ -1810,7 +1816,7 @@
           <a:p>
             <a:fld id="{DF4DFADA-E375-40DE-968A-CBEA23AA7149}" type="datetimeFigureOut">
               <a:rPr lang="es-ES" smtClean="0"/>
-              <a:t>21/01/2022</a:t>
+              <a:t>15/02/2022</a:t>
             </a:fld>
             <a:endParaRPr lang="es-ES"/>
           </a:p>
@@ -1951,7 +1957,7 @@
           <a:p>
             <a:fld id="{DF4DFADA-E375-40DE-968A-CBEA23AA7149}" type="datetimeFigureOut">
               <a:rPr lang="es-ES" smtClean="0"/>
-              <a:t>21/01/2022</a:t>
+              <a:t>15/02/2022</a:t>
             </a:fld>
             <a:endParaRPr lang="es-ES"/>
           </a:p>
@@ -2064,7 +2070,7 @@
           <a:p>
             <a:fld id="{DF4DFADA-E375-40DE-968A-CBEA23AA7149}" type="datetimeFigureOut">
               <a:rPr lang="es-ES" smtClean="0"/>
-              <a:t>21/01/2022</a:t>
+              <a:t>15/02/2022</a:t>
             </a:fld>
             <a:endParaRPr lang="es-ES"/>
           </a:p>
@@ -2375,7 +2381,7 @@
           <a:p>
             <a:fld id="{DF4DFADA-E375-40DE-968A-CBEA23AA7149}" type="datetimeFigureOut">
               <a:rPr lang="es-ES" smtClean="0"/>
-              <a:t>21/01/2022</a:t>
+              <a:t>15/02/2022</a:t>
             </a:fld>
             <a:endParaRPr lang="es-ES"/>
           </a:p>
@@ -2663,7 +2669,7 @@
           <a:p>
             <a:fld id="{DF4DFADA-E375-40DE-968A-CBEA23AA7149}" type="datetimeFigureOut">
               <a:rPr lang="es-ES" smtClean="0"/>
-              <a:t>21/01/2022</a:t>
+              <a:t>15/02/2022</a:t>
             </a:fld>
             <a:endParaRPr lang="es-ES"/>
           </a:p>
@@ -2904,7 +2910,7 @@
           <a:p>
             <a:fld id="{DF4DFADA-E375-40DE-968A-CBEA23AA7149}" type="datetimeFigureOut">
               <a:rPr lang="es-ES" smtClean="0"/>
-              <a:t>21/01/2022</a:t>
+              <a:t>15/02/2022</a:t>
             </a:fld>
             <a:endParaRPr lang="es-ES"/>
           </a:p>
@@ -3561,6 +3567,266 @@
 </p:sld>
 </file>
 
+<file path=ppt/slides/slide2.xml><?xml version="1.0" encoding="utf-8"?>
+<p:sld xmlns:a="http://schemas.openxmlformats.org/drawingml/2006/main" xmlns:r="http://schemas.openxmlformats.org/officeDocument/2006/relationships" xmlns:p="http://schemas.openxmlformats.org/presentationml/2006/main">
+  <p:cSld>
+    <p:spTree>
+      <p:nvGrpSpPr>
+        <p:cNvPr id="1" name=""/>
+        <p:cNvGrpSpPr/>
+        <p:nvPr/>
+      </p:nvGrpSpPr>
+      <p:grpSpPr>
+        <a:xfrm>
+          <a:off x="0" y="0"/>
+          <a:ext cx="0" cy="0"/>
+          <a:chOff x="0" y="0"/>
+          <a:chExt cx="0" cy="0"/>
+        </a:xfrm>
+      </p:grpSpPr>
+      <p:sp>
+        <p:nvSpPr>
+          <p:cNvPr id="2" name="Elipse 1">
+            <a:extLst>
+              <a:ext uri="{FF2B5EF4-FFF2-40B4-BE49-F238E27FC236}">
+                <a16:creationId xmlns:a16="http://schemas.microsoft.com/office/drawing/2014/main" id="{AC11B586-3E34-4BCB-A47F-F721AB676B25}"/>
+              </a:ext>
+            </a:extLst>
+          </p:cNvPr>
+          <p:cNvSpPr/>
+          <p:nvPr/>
+        </p:nvSpPr>
+        <p:spPr>
+          <a:xfrm>
+            <a:off x="4034118" y="2411506"/>
+            <a:ext cx="2160000" cy="2160000"/>
+          </a:xfrm>
+          <a:prstGeom prst="ellipse">
+            <a:avLst/>
+          </a:prstGeom>
+          <a:noFill/>
+          <a:ln w="38100">
+            <a:solidFill>
+              <a:schemeClr val="tx1"/>
+            </a:solidFill>
+          </a:ln>
+        </p:spPr>
+        <p:style>
+          <a:lnRef idx="2">
+            <a:schemeClr val="accent1">
+              <a:shade val="50000"/>
+            </a:schemeClr>
+          </a:lnRef>
+          <a:fillRef idx="1">
+            <a:schemeClr val="accent1"/>
+          </a:fillRef>
+          <a:effectRef idx="0">
+            <a:schemeClr val="accent1"/>
+          </a:effectRef>
+          <a:fontRef idx="minor">
+            <a:schemeClr val="lt1"/>
+          </a:fontRef>
+        </p:style>
+        <p:txBody>
+          <a:bodyPr rtlCol="0" anchor="ctr"/>
+          <a:lstStyle/>
+          <a:p>
+            <a:pPr algn="ctr"/>
+            <a:r>
+              <a:rPr lang="es-ES" sz="4000" dirty="0" err="1">
+                <a:solidFill>
+                  <a:schemeClr val="tx1"/>
+                </a:solidFill>
+              </a:rPr>
+              <a:t>ax</a:t>
+            </a:r>
+            <a:r>
+              <a:rPr lang="es-ES" sz="4000" dirty="0">
+                <a:solidFill>
+                  <a:schemeClr val="tx1"/>
+                </a:solidFill>
+              </a:rPr>
+              <a:t> + b</a:t>
+            </a:r>
+          </a:p>
+        </p:txBody>
+      </p:sp>
+      <p:cxnSp>
+        <p:nvCxnSpPr>
+          <p:cNvPr id="3" name="Conector recto de flecha 2">
+            <a:extLst>
+              <a:ext uri="{FF2B5EF4-FFF2-40B4-BE49-F238E27FC236}">
+                <a16:creationId xmlns:a16="http://schemas.microsoft.com/office/drawing/2014/main" id="{71A23ADC-0EF1-47E8-8245-AF7DFB056FC1}"/>
+              </a:ext>
+            </a:extLst>
+          </p:cNvPr>
+          <p:cNvCxnSpPr>
+            <a:cxnSpLocks/>
+            <a:stCxn id="2" idx="2"/>
+          </p:cNvCxnSpPr>
+          <p:nvPr/>
+        </p:nvCxnSpPr>
+        <p:spPr>
+          <a:xfrm flipH="1">
+            <a:off x="1667436" y="3491506"/>
+            <a:ext cx="2366682" cy="0"/>
+          </a:xfrm>
+          <a:prstGeom prst="straightConnector1">
+            <a:avLst/>
+          </a:prstGeom>
+          <a:ln w="28575">
+            <a:solidFill>
+              <a:schemeClr val="tx1"/>
+            </a:solidFill>
+            <a:headEnd type="triangle" w="med" len="med"/>
+            <a:tailEnd type="none" w="med" len="med"/>
+          </a:ln>
+        </p:spPr>
+        <p:style>
+          <a:lnRef idx="1">
+            <a:schemeClr val="accent1"/>
+          </a:lnRef>
+          <a:fillRef idx="0">
+            <a:schemeClr val="accent1"/>
+          </a:fillRef>
+          <a:effectRef idx="0">
+            <a:schemeClr val="accent1"/>
+          </a:effectRef>
+          <a:fontRef idx="minor">
+            <a:schemeClr val="tx1"/>
+          </a:fontRef>
+        </p:style>
+      </p:cxnSp>
+      <p:cxnSp>
+        <p:nvCxnSpPr>
+          <p:cNvPr id="4" name="Conector recto de flecha 3">
+            <a:extLst>
+              <a:ext uri="{FF2B5EF4-FFF2-40B4-BE49-F238E27FC236}">
+                <a16:creationId xmlns:a16="http://schemas.microsoft.com/office/drawing/2014/main" id="{6A0B19ED-3009-4486-A8CB-5DDD9C5B7320}"/>
+              </a:ext>
+            </a:extLst>
+          </p:cNvPr>
+          <p:cNvCxnSpPr>
+            <a:cxnSpLocks/>
+            <a:endCxn id="2" idx="6"/>
+          </p:cNvCxnSpPr>
+          <p:nvPr/>
+        </p:nvCxnSpPr>
+        <p:spPr>
+          <a:xfrm flipH="1">
+            <a:off x="6194118" y="3491506"/>
+            <a:ext cx="2366682" cy="0"/>
+          </a:xfrm>
+          <a:prstGeom prst="straightConnector1">
+            <a:avLst/>
+          </a:prstGeom>
+          <a:ln w="28575">
+            <a:solidFill>
+              <a:schemeClr val="tx1"/>
+            </a:solidFill>
+            <a:headEnd type="triangle" w="med" len="med"/>
+            <a:tailEnd type="none" w="med" len="med"/>
+          </a:ln>
+        </p:spPr>
+        <p:style>
+          <a:lnRef idx="1">
+            <a:schemeClr val="accent1"/>
+          </a:lnRef>
+          <a:fillRef idx="0">
+            <a:schemeClr val="accent1"/>
+          </a:fillRef>
+          <a:effectRef idx="0">
+            <a:schemeClr val="accent1"/>
+          </a:effectRef>
+          <a:fontRef idx="minor">
+            <a:schemeClr val="tx1"/>
+          </a:fontRef>
+        </p:style>
+      </p:cxnSp>
+      <p:sp>
+        <p:nvSpPr>
+          <p:cNvPr id="5" name="CuadroTexto 4">
+            <a:extLst>
+              <a:ext uri="{FF2B5EF4-FFF2-40B4-BE49-F238E27FC236}">
+                <a16:creationId xmlns:a16="http://schemas.microsoft.com/office/drawing/2014/main" id="{130B9DE1-D9A2-4CE3-A5B2-B1A612669B84}"/>
+              </a:ext>
+            </a:extLst>
+          </p:cNvPr>
+          <p:cNvSpPr txBox="1"/>
+          <p:nvPr/>
+        </p:nvSpPr>
+        <p:spPr>
+          <a:xfrm>
+            <a:off x="1667436" y="2783620"/>
+            <a:ext cx="1362636" cy="707886"/>
+          </a:xfrm>
+          <a:prstGeom prst="rect">
+            <a:avLst/>
+          </a:prstGeom>
+          <a:noFill/>
+        </p:spPr>
+        <p:txBody>
+          <a:bodyPr wrap="square" rtlCol="0">
+            <a:spAutoFit/>
+          </a:bodyPr>
+          <a:lstStyle/>
+          <a:p>
+            <a:r>
+              <a:rPr lang="es-ES" sz="4000" dirty="0"/>
+              <a:t>x</a:t>
+            </a:r>
+          </a:p>
+        </p:txBody>
+      </p:sp>
+      <p:sp>
+        <p:nvSpPr>
+          <p:cNvPr id="6" name="CuadroTexto 5">
+            <a:extLst>
+              <a:ext uri="{FF2B5EF4-FFF2-40B4-BE49-F238E27FC236}">
+                <a16:creationId xmlns:a16="http://schemas.microsoft.com/office/drawing/2014/main" id="{CDDF8D08-3990-4633-BB4E-E1EA5EA15C44}"/>
+              </a:ext>
+            </a:extLst>
+          </p:cNvPr>
+          <p:cNvSpPr txBox="1"/>
+          <p:nvPr/>
+        </p:nvSpPr>
+        <p:spPr>
+          <a:xfrm>
+            <a:off x="7198164" y="2783620"/>
+            <a:ext cx="1362636" cy="707886"/>
+          </a:xfrm>
+          <a:prstGeom prst="rect">
+            <a:avLst/>
+          </a:prstGeom>
+          <a:noFill/>
+        </p:spPr>
+        <p:txBody>
+          <a:bodyPr wrap="square" rtlCol="0">
+            <a:spAutoFit/>
+          </a:bodyPr>
+          <a:lstStyle/>
+          <a:p>
+            <a:pPr algn="r"/>
+            <a:r>
+              <a:rPr lang="es-ES" sz="4000" dirty="0"/>
+              <a:t>z</a:t>
+            </a:r>
+          </a:p>
+        </p:txBody>
+      </p:sp>
+    </p:spTree>
+    <p:extLst>
+      <p:ext uri="{BB962C8B-B14F-4D97-AF65-F5344CB8AC3E}">
+        <p14:creationId xmlns:p14="http://schemas.microsoft.com/office/powerpoint/2010/main" val="2481471874"/>
+      </p:ext>
+    </p:extLst>
+  </p:cSld>
+  <p:clrMapOvr>
+    <a:masterClrMapping/>
+  </p:clrMapOvr>
+</p:sld>
+</file>
+
 <file path=ppt/theme/theme1.xml><?xml version="1.0" encoding="utf-8"?>
 <a:theme xmlns:a="http://schemas.openxmlformats.org/drawingml/2006/main" name="Tema de Office">
   <a:themeElements>

</xml_diff>

<commit_message>
Se añaden figuras y se actualiza el .gitignore
</commit_message>
<xml_diff>
--- a/01 Introduccion a las redes neuronales/Imagenes/Figuras.pptx
+++ b/01 Introduccion a las redes neuronales/Imagenes/Figuras.pptx
@@ -7,6 +7,7 @@
   <p:sldIdLst>
     <p:sldId id="257" r:id="rId2"/>
     <p:sldId id="258" r:id="rId3"/>
+    <p:sldId id="259" r:id="rId4"/>
   </p:sldIdLst>
   <p:sldSz cx="12192000" cy="6858000"/>
   <p:notesSz cx="6858000" cy="9144000"/>
@@ -260,7 +261,7 @@
           <a:p>
             <a:fld id="{DF4DFADA-E375-40DE-968A-CBEA23AA7149}" type="datetimeFigureOut">
               <a:rPr lang="es-ES" smtClean="0"/>
-              <a:t>15/02/2022</a:t>
+              <a:t>23/02/2022</a:t>
             </a:fld>
             <a:endParaRPr lang="es-ES"/>
           </a:p>
@@ -458,7 +459,7 @@
           <a:p>
             <a:fld id="{DF4DFADA-E375-40DE-968A-CBEA23AA7149}" type="datetimeFigureOut">
               <a:rPr lang="es-ES" smtClean="0"/>
-              <a:t>15/02/2022</a:t>
+              <a:t>23/02/2022</a:t>
             </a:fld>
             <a:endParaRPr lang="es-ES"/>
           </a:p>
@@ -666,7 +667,7 @@
           <a:p>
             <a:fld id="{DF4DFADA-E375-40DE-968A-CBEA23AA7149}" type="datetimeFigureOut">
               <a:rPr lang="es-ES" smtClean="0"/>
-              <a:t>15/02/2022</a:t>
+              <a:t>23/02/2022</a:t>
             </a:fld>
             <a:endParaRPr lang="es-ES"/>
           </a:p>
@@ -864,7 +865,7 @@
           <a:p>
             <a:fld id="{DF4DFADA-E375-40DE-968A-CBEA23AA7149}" type="datetimeFigureOut">
               <a:rPr lang="es-ES" smtClean="0"/>
-              <a:t>15/02/2022</a:t>
+              <a:t>23/02/2022</a:t>
             </a:fld>
             <a:endParaRPr lang="es-ES"/>
           </a:p>
@@ -1139,7 +1140,7 @@
           <a:p>
             <a:fld id="{DF4DFADA-E375-40DE-968A-CBEA23AA7149}" type="datetimeFigureOut">
               <a:rPr lang="es-ES" smtClean="0"/>
-              <a:t>15/02/2022</a:t>
+              <a:t>23/02/2022</a:t>
             </a:fld>
             <a:endParaRPr lang="es-ES"/>
           </a:p>
@@ -1404,7 +1405,7 @@
           <a:p>
             <a:fld id="{DF4DFADA-E375-40DE-968A-CBEA23AA7149}" type="datetimeFigureOut">
               <a:rPr lang="es-ES" smtClean="0"/>
-              <a:t>15/02/2022</a:t>
+              <a:t>23/02/2022</a:t>
             </a:fld>
             <a:endParaRPr lang="es-ES"/>
           </a:p>
@@ -1816,7 +1817,7 @@
           <a:p>
             <a:fld id="{DF4DFADA-E375-40DE-968A-CBEA23AA7149}" type="datetimeFigureOut">
               <a:rPr lang="es-ES" smtClean="0"/>
-              <a:t>15/02/2022</a:t>
+              <a:t>23/02/2022</a:t>
             </a:fld>
             <a:endParaRPr lang="es-ES"/>
           </a:p>
@@ -1957,7 +1958,7 @@
           <a:p>
             <a:fld id="{DF4DFADA-E375-40DE-968A-CBEA23AA7149}" type="datetimeFigureOut">
               <a:rPr lang="es-ES" smtClean="0"/>
-              <a:t>15/02/2022</a:t>
+              <a:t>23/02/2022</a:t>
             </a:fld>
             <a:endParaRPr lang="es-ES"/>
           </a:p>
@@ -2070,7 +2071,7 @@
           <a:p>
             <a:fld id="{DF4DFADA-E375-40DE-968A-CBEA23AA7149}" type="datetimeFigureOut">
               <a:rPr lang="es-ES" smtClean="0"/>
-              <a:t>15/02/2022</a:t>
+              <a:t>23/02/2022</a:t>
             </a:fld>
             <a:endParaRPr lang="es-ES"/>
           </a:p>
@@ -2381,7 +2382,7 @@
           <a:p>
             <a:fld id="{DF4DFADA-E375-40DE-968A-CBEA23AA7149}" type="datetimeFigureOut">
               <a:rPr lang="es-ES" smtClean="0"/>
-              <a:t>15/02/2022</a:t>
+              <a:t>23/02/2022</a:t>
             </a:fld>
             <a:endParaRPr lang="es-ES"/>
           </a:p>
@@ -2669,7 +2670,7 @@
           <a:p>
             <a:fld id="{DF4DFADA-E375-40DE-968A-CBEA23AA7149}" type="datetimeFigureOut">
               <a:rPr lang="es-ES" smtClean="0"/>
-              <a:t>15/02/2022</a:t>
+              <a:t>23/02/2022</a:t>
             </a:fld>
             <a:endParaRPr lang="es-ES"/>
           </a:p>
@@ -2910,7 +2911,7 @@
           <a:p>
             <a:fld id="{DF4DFADA-E375-40DE-968A-CBEA23AA7149}" type="datetimeFigureOut">
               <a:rPr lang="es-ES" smtClean="0"/>
-              <a:t>15/02/2022</a:t>
+              <a:t>23/02/2022</a:t>
             </a:fld>
             <a:endParaRPr lang="es-ES"/>
           </a:p>
@@ -3827,6 +3828,426 @@
 </p:sld>
 </file>
 
+<file path=ppt/slides/slide3.xml><?xml version="1.0" encoding="utf-8"?>
+<p:sld xmlns:a="http://schemas.openxmlformats.org/drawingml/2006/main" xmlns:r="http://schemas.openxmlformats.org/officeDocument/2006/relationships" xmlns:p="http://schemas.openxmlformats.org/presentationml/2006/main">
+  <p:cSld>
+    <p:spTree>
+      <p:nvGrpSpPr>
+        <p:cNvPr id="1" name=""/>
+        <p:cNvGrpSpPr/>
+        <p:nvPr/>
+      </p:nvGrpSpPr>
+      <p:grpSpPr>
+        <a:xfrm>
+          <a:off x="0" y="0"/>
+          <a:ext cx="0" cy="0"/>
+          <a:chOff x="0" y="0"/>
+          <a:chExt cx="0" cy="0"/>
+        </a:xfrm>
+      </p:grpSpPr>
+      <p:sp>
+        <p:nvSpPr>
+          <p:cNvPr id="2" name="Elipse 1">
+            <a:extLst>
+              <a:ext uri="{FF2B5EF4-FFF2-40B4-BE49-F238E27FC236}">
+                <a16:creationId xmlns:a16="http://schemas.microsoft.com/office/drawing/2014/main" id="{AC11B586-3E34-4BCB-A47F-F721AB676B25}"/>
+              </a:ext>
+            </a:extLst>
+          </p:cNvPr>
+          <p:cNvSpPr/>
+          <p:nvPr/>
+        </p:nvSpPr>
+        <p:spPr>
+          <a:xfrm>
+            <a:off x="4034117" y="2411506"/>
+            <a:ext cx="5118848" cy="2160000"/>
+          </a:xfrm>
+          <a:prstGeom prst="ellipse">
+            <a:avLst/>
+          </a:prstGeom>
+          <a:noFill/>
+          <a:ln w="38100">
+            <a:solidFill>
+              <a:schemeClr val="tx1"/>
+            </a:solidFill>
+          </a:ln>
+        </p:spPr>
+        <p:style>
+          <a:lnRef idx="2">
+            <a:schemeClr val="accent1">
+              <a:shade val="50000"/>
+            </a:schemeClr>
+          </a:lnRef>
+          <a:fillRef idx="1">
+            <a:schemeClr val="accent1"/>
+          </a:fillRef>
+          <a:effectRef idx="0">
+            <a:schemeClr val="accent1"/>
+          </a:effectRef>
+          <a:fontRef idx="minor">
+            <a:schemeClr val="lt1"/>
+          </a:fontRef>
+        </p:style>
+        <p:txBody>
+          <a:bodyPr rtlCol="0" anchor="ctr"/>
+          <a:lstStyle/>
+          <a:p>
+            <a:pPr algn="ctr"/>
+            <a:r>
+              <a:rPr lang="el-GR" sz="4000" dirty="0">
+                <a:solidFill>
+                  <a:schemeClr val="tx1"/>
+                </a:solidFill>
+              </a:rPr>
+              <a:t>ω</a:t>
+            </a:r>
+            <a:r>
+              <a:rPr lang="es-ES" sz="4000" dirty="0">
+                <a:solidFill>
+                  <a:schemeClr val="tx1"/>
+                </a:solidFill>
+              </a:rPr>
+              <a:t>0 + </a:t>
+            </a:r>
+            <a:r>
+              <a:rPr lang="el-GR" sz="4000" dirty="0">
+                <a:solidFill>
+                  <a:schemeClr val="tx1"/>
+                </a:solidFill>
+              </a:rPr>
+              <a:t>ω</a:t>
+            </a:r>
+            <a:r>
+              <a:rPr lang="es-ES" sz="4000" baseline="-25000" dirty="0">
+                <a:solidFill>
+                  <a:schemeClr val="tx1"/>
+                </a:solidFill>
+              </a:rPr>
+              <a:t>1</a:t>
+            </a:r>
+            <a:r>
+              <a:rPr lang="es-ES" sz="4000" dirty="0">
+                <a:solidFill>
+                  <a:schemeClr val="tx1"/>
+                </a:solidFill>
+              </a:rPr>
+              <a:t>x</a:t>
+            </a:r>
+            <a:r>
+              <a:rPr lang="es-ES" sz="4000" baseline="-25000" dirty="0">
+                <a:solidFill>
+                  <a:schemeClr val="tx1"/>
+                </a:solidFill>
+              </a:rPr>
+              <a:t>1</a:t>
+            </a:r>
+            <a:r>
+              <a:rPr lang="es-ES" sz="4000" dirty="0">
+                <a:solidFill>
+                  <a:schemeClr val="tx1"/>
+                </a:solidFill>
+              </a:rPr>
+              <a:t> + </a:t>
+            </a:r>
+            <a:r>
+              <a:rPr lang="el-GR" sz="4000" dirty="0">
+                <a:solidFill>
+                  <a:schemeClr val="tx1"/>
+                </a:solidFill>
+              </a:rPr>
+              <a:t>ω</a:t>
+            </a:r>
+            <a:r>
+              <a:rPr lang="es-ES" sz="4000" baseline="-25000" dirty="0">
+                <a:solidFill>
+                  <a:schemeClr val="tx1"/>
+                </a:solidFill>
+              </a:rPr>
+              <a:t>2</a:t>
+            </a:r>
+            <a:r>
+              <a:rPr lang="es-ES" sz="4000" dirty="0">
+                <a:solidFill>
+                  <a:schemeClr val="tx1"/>
+                </a:solidFill>
+              </a:rPr>
+              <a:t>x</a:t>
+            </a:r>
+            <a:r>
+              <a:rPr lang="es-ES" sz="4000" baseline="-25000" dirty="0">
+                <a:solidFill>
+                  <a:schemeClr val="tx1"/>
+                </a:solidFill>
+              </a:rPr>
+              <a:t>2</a:t>
+            </a:r>
+          </a:p>
+        </p:txBody>
+      </p:sp>
+      <p:cxnSp>
+        <p:nvCxnSpPr>
+          <p:cNvPr id="3" name="Conector recto de flecha 2">
+            <a:extLst>
+              <a:ext uri="{FF2B5EF4-FFF2-40B4-BE49-F238E27FC236}">
+                <a16:creationId xmlns:a16="http://schemas.microsoft.com/office/drawing/2014/main" id="{71A23ADC-0EF1-47E8-8245-AF7DFB056FC1}"/>
+              </a:ext>
+            </a:extLst>
+          </p:cNvPr>
+          <p:cNvCxnSpPr>
+            <a:cxnSpLocks/>
+            <a:stCxn id="2" idx="2"/>
+          </p:cNvCxnSpPr>
+          <p:nvPr/>
+        </p:nvCxnSpPr>
+        <p:spPr>
+          <a:xfrm flipH="1" flipV="1">
+            <a:off x="1667436" y="2348753"/>
+            <a:ext cx="2366681" cy="1142753"/>
+          </a:xfrm>
+          <a:prstGeom prst="straightConnector1">
+            <a:avLst/>
+          </a:prstGeom>
+          <a:ln w="28575">
+            <a:solidFill>
+              <a:schemeClr val="tx1"/>
+            </a:solidFill>
+            <a:headEnd type="triangle" w="med" len="med"/>
+            <a:tailEnd type="none" w="med" len="med"/>
+          </a:ln>
+        </p:spPr>
+        <p:style>
+          <a:lnRef idx="1">
+            <a:schemeClr val="accent1"/>
+          </a:lnRef>
+          <a:fillRef idx="0">
+            <a:schemeClr val="accent1"/>
+          </a:fillRef>
+          <a:effectRef idx="0">
+            <a:schemeClr val="accent1"/>
+          </a:effectRef>
+          <a:fontRef idx="minor">
+            <a:schemeClr val="tx1"/>
+          </a:fontRef>
+        </p:style>
+      </p:cxnSp>
+      <p:cxnSp>
+        <p:nvCxnSpPr>
+          <p:cNvPr id="4" name="Conector recto de flecha 3">
+            <a:extLst>
+              <a:ext uri="{FF2B5EF4-FFF2-40B4-BE49-F238E27FC236}">
+                <a16:creationId xmlns:a16="http://schemas.microsoft.com/office/drawing/2014/main" id="{6A0B19ED-3009-4486-A8CB-5DDD9C5B7320}"/>
+              </a:ext>
+            </a:extLst>
+          </p:cNvPr>
+          <p:cNvCxnSpPr>
+            <a:cxnSpLocks/>
+            <a:endCxn id="2" idx="6"/>
+          </p:cNvCxnSpPr>
+          <p:nvPr/>
+        </p:nvCxnSpPr>
+        <p:spPr>
+          <a:xfrm flipH="1">
+            <a:off x="9152965" y="3491506"/>
+            <a:ext cx="1846729" cy="0"/>
+          </a:xfrm>
+          <a:prstGeom prst="straightConnector1">
+            <a:avLst/>
+          </a:prstGeom>
+          <a:ln w="28575">
+            <a:solidFill>
+              <a:schemeClr val="tx1"/>
+            </a:solidFill>
+            <a:headEnd type="triangle" w="med" len="med"/>
+            <a:tailEnd type="none" w="med" len="med"/>
+          </a:ln>
+        </p:spPr>
+        <p:style>
+          <a:lnRef idx="1">
+            <a:schemeClr val="accent1"/>
+          </a:lnRef>
+          <a:fillRef idx="0">
+            <a:schemeClr val="accent1"/>
+          </a:fillRef>
+          <a:effectRef idx="0">
+            <a:schemeClr val="accent1"/>
+          </a:effectRef>
+          <a:fontRef idx="minor">
+            <a:schemeClr val="tx1"/>
+          </a:fontRef>
+        </p:style>
+      </p:cxnSp>
+      <p:sp>
+        <p:nvSpPr>
+          <p:cNvPr id="5" name="CuadroTexto 4">
+            <a:extLst>
+              <a:ext uri="{FF2B5EF4-FFF2-40B4-BE49-F238E27FC236}">
+                <a16:creationId xmlns:a16="http://schemas.microsoft.com/office/drawing/2014/main" id="{130B9DE1-D9A2-4CE3-A5B2-B1A612669B84}"/>
+              </a:ext>
+            </a:extLst>
+          </p:cNvPr>
+          <p:cNvSpPr txBox="1"/>
+          <p:nvPr/>
+        </p:nvSpPr>
+        <p:spPr>
+          <a:xfrm>
+            <a:off x="1290919" y="1703620"/>
+            <a:ext cx="1362636" cy="707886"/>
+          </a:xfrm>
+          <a:prstGeom prst="rect">
+            <a:avLst/>
+          </a:prstGeom>
+          <a:noFill/>
+        </p:spPr>
+        <p:txBody>
+          <a:bodyPr wrap="square" rtlCol="0">
+            <a:spAutoFit/>
+          </a:bodyPr>
+          <a:lstStyle/>
+          <a:p>
+            <a:r>
+              <a:rPr lang="es-ES" sz="4000" dirty="0"/>
+              <a:t>x</a:t>
+            </a:r>
+            <a:r>
+              <a:rPr lang="es-ES" sz="4000" baseline="-25000" dirty="0"/>
+              <a:t>1</a:t>
+            </a:r>
+          </a:p>
+        </p:txBody>
+      </p:sp>
+      <p:sp>
+        <p:nvSpPr>
+          <p:cNvPr id="6" name="CuadroTexto 5">
+            <a:extLst>
+              <a:ext uri="{FF2B5EF4-FFF2-40B4-BE49-F238E27FC236}">
+                <a16:creationId xmlns:a16="http://schemas.microsoft.com/office/drawing/2014/main" id="{CDDF8D08-3990-4633-BB4E-E1EA5EA15C44}"/>
+              </a:ext>
+            </a:extLst>
+          </p:cNvPr>
+          <p:cNvSpPr txBox="1"/>
+          <p:nvPr/>
+        </p:nvSpPr>
+        <p:spPr>
+          <a:xfrm>
+            <a:off x="9528987" y="2783620"/>
+            <a:ext cx="1362636" cy="707886"/>
+          </a:xfrm>
+          <a:prstGeom prst="rect">
+            <a:avLst/>
+          </a:prstGeom>
+          <a:noFill/>
+        </p:spPr>
+        <p:txBody>
+          <a:bodyPr wrap="square" rtlCol="0">
+            <a:spAutoFit/>
+          </a:bodyPr>
+          <a:lstStyle/>
+          <a:p>
+            <a:pPr algn="r"/>
+            <a:r>
+              <a:rPr lang="es-ES" sz="4000" dirty="0"/>
+              <a:t>z</a:t>
+            </a:r>
+          </a:p>
+        </p:txBody>
+      </p:sp>
+      <p:cxnSp>
+        <p:nvCxnSpPr>
+          <p:cNvPr id="8" name="Conector recto de flecha 7">
+            <a:extLst>
+              <a:ext uri="{FF2B5EF4-FFF2-40B4-BE49-F238E27FC236}">
+                <a16:creationId xmlns:a16="http://schemas.microsoft.com/office/drawing/2014/main" id="{9B590CAC-90FE-4740-85C8-8C7EFEF9FAA1}"/>
+              </a:ext>
+            </a:extLst>
+          </p:cNvPr>
+          <p:cNvCxnSpPr>
+            <a:cxnSpLocks/>
+          </p:cNvCxnSpPr>
+          <p:nvPr/>
+        </p:nvCxnSpPr>
+        <p:spPr>
+          <a:xfrm flipH="1">
+            <a:off x="1667436" y="3491506"/>
+            <a:ext cx="2366682" cy="1142753"/>
+          </a:xfrm>
+          <a:prstGeom prst="straightConnector1">
+            <a:avLst/>
+          </a:prstGeom>
+          <a:ln w="28575">
+            <a:solidFill>
+              <a:schemeClr val="tx1"/>
+            </a:solidFill>
+            <a:headEnd type="triangle" w="med" len="med"/>
+            <a:tailEnd type="none" w="med" len="med"/>
+          </a:ln>
+        </p:spPr>
+        <p:style>
+          <a:lnRef idx="1">
+            <a:schemeClr val="accent1"/>
+          </a:lnRef>
+          <a:fillRef idx="0">
+            <a:schemeClr val="accent1"/>
+          </a:fillRef>
+          <a:effectRef idx="0">
+            <a:schemeClr val="accent1"/>
+          </a:effectRef>
+          <a:fontRef idx="minor">
+            <a:schemeClr val="tx1"/>
+          </a:fontRef>
+        </p:style>
+      </p:cxnSp>
+      <p:sp>
+        <p:nvSpPr>
+          <p:cNvPr id="9" name="CuadroTexto 8">
+            <a:extLst>
+              <a:ext uri="{FF2B5EF4-FFF2-40B4-BE49-F238E27FC236}">
+                <a16:creationId xmlns:a16="http://schemas.microsoft.com/office/drawing/2014/main" id="{05304D7E-CD8F-40B1-8691-C42CE5657426}"/>
+              </a:ext>
+            </a:extLst>
+          </p:cNvPr>
+          <p:cNvSpPr txBox="1"/>
+          <p:nvPr/>
+        </p:nvSpPr>
+        <p:spPr>
+          <a:xfrm>
+            <a:off x="1192800" y="3926373"/>
+            <a:ext cx="1362636" cy="707886"/>
+          </a:xfrm>
+          <a:prstGeom prst="rect">
+            <a:avLst/>
+          </a:prstGeom>
+          <a:noFill/>
+        </p:spPr>
+        <p:txBody>
+          <a:bodyPr wrap="square" rtlCol="0">
+            <a:spAutoFit/>
+          </a:bodyPr>
+          <a:lstStyle/>
+          <a:p>
+            <a:r>
+              <a:rPr lang="es-ES" sz="4000" dirty="0"/>
+              <a:t>x</a:t>
+            </a:r>
+            <a:r>
+              <a:rPr lang="es-ES" sz="4000" baseline="-25000" dirty="0"/>
+              <a:t>2</a:t>
+            </a:r>
+          </a:p>
+        </p:txBody>
+      </p:sp>
+    </p:spTree>
+    <p:extLst>
+      <p:ext uri="{BB962C8B-B14F-4D97-AF65-F5344CB8AC3E}">
+        <p14:creationId xmlns:p14="http://schemas.microsoft.com/office/powerpoint/2010/main" val="1915148220"/>
+      </p:ext>
+    </p:extLst>
+  </p:cSld>
+  <p:clrMapOvr>
+    <a:masterClrMapping/>
+  </p:clrMapOvr>
+</p:sld>
+</file>
+
 <file path=ppt/theme/theme1.xml><?xml version="1.0" encoding="utf-8"?>
 <a:theme xmlns:a="http://schemas.openxmlformats.org/drawingml/2006/main" name="Tema de Office">
   <a:themeElements>

</xml_diff>

<commit_message>
Se crea el cuaderno de la puerta lógica XNOR
</commit_message>
<xml_diff>
--- a/01 Introduccion a las redes neuronales/Imagenes/Figuras.pptx
+++ b/01 Introduccion a las redes neuronales/Imagenes/Figuras.pptx
@@ -8,6 +8,9 @@
     <p:sldId id="257" r:id="rId2"/>
     <p:sldId id="258" r:id="rId3"/>
     <p:sldId id="259" r:id="rId4"/>
+    <p:sldId id="260" r:id="rId5"/>
+    <p:sldId id="261" r:id="rId6"/>
+    <p:sldId id="262" r:id="rId7"/>
   </p:sldIdLst>
   <p:sldSz cx="12192000" cy="6858000"/>
   <p:notesSz cx="6858000" cy="9144000"/>
@@ -261,7 +264,7 @@
           <a:p>
             <a:fld id="{DF4DFADA-E375-40DE-968A-CBEA23AA7149}" type="datetimeFigureOut">
               <a:rPr lang="es-ES" smtClean="0"/>
-              <a:t>23/02/2022</a:t>
+              <a:t>03/03/2022</a:t>
             </a:fld>
             <a:endParaRPr lang="es-ES"/>
           </a:p>
@@ -459,7 +462,7 @@
           <a:p>
             <a:fld id="{DF4DFADA-E375-40DE-968A-CBEA23AA7149}" type="datetimeFigureOut">
               <a:rPr lang="es-ES" smtClean="0"/>
-              <a:t>23/02/2022</a:t>
+              <a:t>03/03/2022</a:t>
             </a:fld>
             <a:endParaRPr lang="es-ES"/>
           </a:p>
@@ -667,7 +670,7 @@
           <a:p>
             <a:fld id="{DF4DFADA-E375-40DE-968A-CBEA23AA7149}" type="datetimeFigureOut">
               <a:rPr lang="es-ES" smtClean="0"/>
-              <a:t>23/02/2022</a:t>
+              <a:t>03/03/2022</a:t>
             </a:fld>
             <a:endParaRPr lang="es-ES"/>
           </a:p>
@@ -865,7 +868,7 @@
           <a:p>
             <a:fld id="{DF4DFADA-E375-40DE-968A-CBEA23AA7149}" type="datetimeFigureOut">
               <a:rPr lang="es-ES" smtClean="0"/>
-              <a:t>23/02/2022</a:t>
+              <a:t>03/03/2022</a:t>
             </a:fld>
             <a:endParaRPr lang="es-ES"/>
           </a:p>
@@ -1140,7 +1143,7 @@
           <a:p>
             <a:fld id="{DF4DFADA-E375-40DE-968A-CBEA23AA7149}" type="datetimeFigureOut">
               <a:rPr lang="es-ES" smtClean="0"/>
-              <a:t>23/02/2022</a:t>
+              <a:t>03/03/2022</a:t>
             </a:fld>
             <a:endParaRPr lang="es-ES"/>
           </a:p>
@@ -1405,7 +1408,7 @@
           <a:p>
             <a:fld id="{DF4DFADA-E375-40DE-968A-CBEA23AA7149}" type="datetimeFigureOut">
               <a:rPr lang="es-ES" smtClean="0"/>
-              <a:t>23/02/2022</a:t>
+              <a:t>03/03/2022</a:t>
             </a:fld>
             <a:endParaRPr lang="es-ES"/>
           </a:p>
@@ -1817,7 +1820,7 @@
           <a:p>
             <a:fld id="{DF4DFADA-E375-40DE-968A-CBEA23AA7149}" type="datetimeFigureOut">
               <a:rPr lang="es-ES" smtClean="0"/>
-              <a:t>23/02/2022</a:t>
+              <a:t>03/03/2022</a:t>
             </a:fld>
             <a:endParaRPr lang="es-ES"/>
           </a:p>
@@ -1958,7 +1961,7 @@
           <a:p>
             <a:fld id="{DF4DFADA-E375-40DE-968A-CBEA23AA7149}" type="datetimeFigureOut">
               <a:rPr lang="es-ES" smtClean="0"/>
-              <a:t>23/02/2022</a:t>
+              <a:t>03/03/2022</a:t>
             </a:fld>
             <a:endParaRPr lang="es-ES"/>
           </a:p>
@@ -2071,7 +2074,7 @@
           <a:p>
             <a:fld id="{DF4DFADA-E375-40DE-968A-CBEA23AA7149}" type="datetimeFigureOut">
               <a:rPr lang="es-ES" smtClean="0"/>
-              <a:t>23/02/2022</a:t>
+              <a:t>03/03/2022</a:t>
             </a:fld>
             <a:endParaRPr lang="es-ES"/>
           </a:p>
@@ -2382,7 +2385,7 @@
           <a:p>
             <a:fld id="{DF4DFADA-E375-40DE-968A-CBEA23AA7149}" type="datetimeFigureOut">
               <a:rPr lang="es-ES" smtClean="0"/>
-              <a:t>23/02/2022</a:t>
+              <a:t>03/03/2022</a:t>
             </a:fld>
             <a:endParaRPr lang="es-ES"/>
           </a:p>
@@ -2670,7 +2673,7 @@
           <a:p>
             <a:fld id="{DF4DFADA-E375-40DE-968A-CBEA23AA7149}" type="datetimeFigureOut">
               <a:rPr lang="es-ES" smtClean="0"/>
-              <a:t>23/02/2022</a:t>
+              <a:t>03/03/2022</a:t>
             </a:fld>
             <a:endParaRPr lang="es-ES"/>
           </a:p>
@@ -2911,7 +2914,7 @@
           <a:p>
             <a:fld id="{DF4DFADA-E375-40DE-968A-CBEA23AA7149}" type="datetimeFigureOut">
               <a:rPr lang="es-ES" smtClean="0"/>
-              <a:t>23/02/2022</a:t>
+              <a:t>03/03/2022</a:t>
             </a:fld>
             <a:endParaRPr lang="es-ES"/>
           </a:p>
@@ -4248,6 +4251,2958 @@
 </p:sld>
 </file>
 
+<file path=ppt/slides/slide4.xml><?xml version="1.0" encoding="utf-8"?>
+<p:sld xmlns:a="http://schemas.openxmlformats.org/drawingml/2006/main" xmlns:r="http://schemas.openxmlformats.org/officeDocument/2006/relationships" xmlns:p="http://schemas.openxmlformats.org/presentationml/2006/main">
+  <p:cSld>
+    <p:spTree>
+      <p:nvGrpSpPr>
+        <p:cNvPr id="1" name=""/>
+        <p:cNvGrpSpPr/>
+        <p:nvPr/>
+      </p:nvGrpSpPr>
+      <p:grpSpPr>
+        <a:xfrm>
+          <a:off x="0" y="0"/>
+          <a:ext cx="0" cy="0"/>
+          <a:chOff x="0" y="0"/>
+          <a:chExt cx="0" cy="0"/>
+        </a:xfrm>
+      </p:grpSpPr>
+      <p:cxnSp>
+        <p:nvCxnSpPr>
+          <p:cNvPr id="3" name="Conector recto de flecha 2">
+            <a:extLst>
+              <a:ext uri="{FF2B5EF4-FFF2-40B4-BE49-F238E27FC236}">
+                <a16:creationId xmlns:a16="http://schemas.microsoft.com/office/drawing/2014/main" id="{71A23ADC-0EF1-47E8-8245-AF7DFB056FC1}"/>
+              </a:ext>
+            </a:extLst>
+          </p:cNvPr>
+          <p:cNvCxnSpPr>
+            <a:cxnSpLocks/>
+            <a:stCxn id="10" idx="2"/>
+            <a:endCxn id="5" idx="3"/>
+          </p:cNvCxnSpPr>
+          <p:nvPr/>
+        </p:nvCxnSpPr>
+        <p:spPr>
+          <a:xfrm flipH="1">
+            <a:off x="1945341" y="1913886"/>
+            <a:ext cx="2088776" cy="143677"/>
+          </a:xfrm>
+          <a:prstGeom prst="straightConnector1">
+            <a:avLst/>
+          </a:prstGeom>
+          <a:ln w="28575">
+            <a:solidFill>
+              <a:schemeClr val="tx1"/>
+            </a:solidFill>
+            <a:headEnd type="triangle" w="med" len="med"/>
+            <a:tailEnd type="none" w="med" len="med"/>
+          </a:ln>
+        </p:spPr>
+        <p:style>
+          <a:lnRef idx="1">
+            <a:schemeClr val="accent1"/>
+          </a:lnRef>
+          <a:fillRef idx="0">
+            <a:schemeClr val="accent1"/>
+          </a:fillRef>
+          <a:effectRef idx="0">
+            <a:schemeClr val="accent1"/>
+          </a:effectRef>
+          <a:fontRef idx="minor">
+            <a:schemeClr val="tx1"/>
+          </a:fontRef>
+        </p:style>
+      </p:cxnSp>
+      <p:cxnSp>
+        <p:nvCxnSpPr>
+          <p:cNvPr id="4" name="Conector recto de flecha 3">
+            <a:extLst>
+              <a:ext uri="{FF2B5EF4-FFF2-40B4-BE49-F238E27FC236}">
+                <a16:creationId xmlns:a16="http://schemas.microsoft.com/office/drawing/2014/main" id="{6A0B19ED-3009-4486-A8CB-5DDD9C5B7320}"/>
+              </a:ext>
+            </a:extLst>
+          </p:cNvPr>
+          <p:cNvCxnSpPr>
+            <a:cxnSpLocks/>
+          </p:cNvCxnSpPr>
+          <p:nvPr/>
+        </p:nvCxnSpPr>
+        <p:spPr>
+          <a:xfrm flipH="1">
+            <a:off x="9152965" y="3491506"/>
+            <a:ext cx="1846729" cy="0"/>
+          </a:xfrm>
+          <a:prstGeom prst="straightConnector1">
+            <a:avLst/>
+          </a:prstGeom>
+          <a:ln w="28575">
+            <a:solidFill>
+              <a:schemeClr val="tx1"/>
+            </a:solidFill>
+            <a:headEnd type="triangle" w="med" len="med"/>
+            <a:tailEnd type="none" w="med" len="med"/>
+          </a:ln>
+        </p:spPr>
+        <p:style>
+          <a:lnRef idx="1">
+            <a:schemeClr val="accent1"/>
+          </a:lnRef>
+          <a:fillRef idx="0">
+            <a:schemeClr val="accent1"/>
+          </a:fillRef>
+          <a:effectRef idx="0">
+            <a:schemeClr val="accent1"/>
+          </a:effectRef>
+          <a:fontRef idx="minor">
+            <a:schemeClr val="tx1"/>
+          </a:fontRef>
+        </p:style>
+      </p:cxnSp>
+      <p:sp>
+        <p:nvSpPr>
+          <p:cNvPr id="5" name="CuadroTexto 4">
+            <a:extLst>
+              <a:ext uri="{FF2B5EF4-FFF2-40B4-BE49-F238E27FC236}">
+                <a16:creationId xmlns:a16="http://schemas.microsoft.com/office/drawing/2014/main" id="{130B9DE1-D9A2-4CE3-A5B2-B1A612669B84}"/>
+              </a:ext>
+            </a:extLst>
+          </p:cNvPr>
+          <p:cNvSpPr txBox="1"/>
+          <p:nvPr/>
+        </p:nvSpPr>
+        <p:spPr>
+          <a:xfrm>
+            <a:off x="1290919" y="1703620"/>
+            <a:ext cx="654422" cy="707886"/>
+          </a:xfrm>
+          <a:prstGeom prst="rect">
+            <a:avLst/>
+          </a:prstGeom>
+          <a:noFill/>
+        </p:spPr>
+        <p:txBody>
+          <a:bodyPr wrap="square" rtlCol="0">
+            <a:spAutoFit/>
+          </a:bodyPr>
+          <a:lstStyle/>
+          <a:p>
+            <a:r>
+              <a:rPr lang="es-ES" sz="4000" dirty="0"/>
+              <a:t>x</a:t>
+            </a:r>
+            <a:r>
+              <a:rPr lang="es-ES" sz="4000" baseline="-25000" dirty="0"/>
+              <a:t>1</a:t>
+            </a:r>
+          </a:p>
+        </p:txBody>
+      </p:sp>
+      <p:sp>
+        <p:nvSpPr>
+          <p:cNvPr id="6" name="CuadroTexto 5">
+            <a:extLst>
+              <a:ext uri="{FF2B5EF4-FFF2-40B4-BE49-F238E27FC236}">
+                <a16:creationId xmlns:a16="http://schemas.microsoft.com/office/drawing/2014/main" id="{CDDF8D08-3990-4633-BB4E-E1EA5EA15C44}"/>
+              </a:ext>
+            </a:extLst>
+          </p:cNvPr>
+          <p:cNvSpPr txBox="1"/>
+          <p:nvPr/>
+        </p:nvSpPr>
+        <p:spPr>
+          <a:xfrm>
+            <a:off x="10452847" y="2783620"/>
+            <a:ext cx="438776" cy="707886"/>
+          </a:xfrm>
+          <a:prstGeom prst="rect">
+            <a:avLst/>
+          </a:prstGeom>
+          <a:noFill/>
+        </p:spPr>
+        <p:txBody>
+          <a:bodyPr wrap="square" rtlCol="0">
+            <a:spAutoFit/>
+          </a:bodyPr>
+          <a:lstStyle/>
+          <a:p>
+            <a:pPr algn="r"/>
+            <a:r>
+              <a:rPr lang="es-ES" sz="4000" dirty="0"/>
+              <a:t>z</a:t>
+            </a:r>
+          </a:p>
+        </p:txBody>
+      </p:sp>
+      <p:cxnSp>
+        <p:nvCxnSpPr>
+          <p:cNvPr id="8" name="Conector recto de flecha 7">
+            <a:extLst>
+              <a:ext uri="{FF2B5EF4-FFF2-40B4-BE49-F238E27FC236}">
+                <a16:creationId xmlns:a16="http://schemas.microsoft.com/office/drawing/2014/main" id="{9B590CAC-90FE-4740-85C8-8C7EFEF9FAA1}"/>
+              </a:ext>
+            </a:extLst>
+          </p:cNvPr>
+          <p:cNvCxnSpPr>
+            <a:cxnSpLocks/>
+            <a:stCxn id="10" idx="2"/>
+            <a:endCxn id="9" idx="3"/>
+          </p:cNvCxnSpPr>
+          <p:nvPr/>
+        </p:nvCxnSpPr>
+        <p:spPr>
+          <a:xfrm flipH="1">
+            <a:off x="1945341" y="1913886"/>
+            <a:ext cx="2088776" cy="2366430"/>
+          </a:xfrm>
+          <a:prstGeom prst="straightConnector1">
+            <a:avLst/>
+          </a:prstGeom>
+          <a:ln w="28575">
+            <a:solidFill>
+              <a:schemeClr val="tx1"/>
+            </a:solidFill>
+            <a:headEnd type="triangle" w="med" len="med"/>
+            <a:tailEnd type="none" w="med" len="med"/>
+          </a:ln>
+        </p:spPr>
+        <p:style>
+          <a:lnRef idx="1">
+            <a:schemeClr val="accent1"/>
+          </a:lnRef>
+          <a:fillRef idx="0">
+            <a:schemeClr val="accent1"/>
+          </a:fillRef>
+          <a:effectRef idx="0">
+            <a:schemeClr val="accent1"/>
+          </a:effectRef>
+          <a:fontRef idx="minor">
+            <a:schemeClr val="tx1"/>
+          </a:fontRef>
+        </p:style>
+      </p:cxnSp>
+      <p:sp>
+        <p:nvSpPr>
+          <p:cNvPr id="9" name="CuadroTexto 8">
+            <a:extLst>
+              <a:ext uri="{FF2B5EF4-FFF2-40B4-BE49-F238E27FC236}">
+                <a16:creationId xmlns:a16="http://schemas.microsoft.com/office/drawing/2014/main" id="{05304D7E-CD8F-40B1-8691-C42CE5657426}"/>
+              </a:ext>
+            </a:extLst>
+          </p:cNvPr>
+          <p:cNvSpPr txBox="1"/>
+          <p:nvPr/>
+        </p:nvSpPr>
+        <p:spPr>
+          <a:xfrm>
+            <a:off x="1192800" y="3926373"/>
+            <a:ext cx="752541" cy="707886"/>
+          </a:xfrm>
+          <a:prstGeom prst="rect">
+            <a:avLst/>
+          </a:prstGeom>
+          <a:noFill/>
+        </p:spPr>
+        <p:txBody>
+          <a:bodyPr wrap="square" rtlCol="0">
+            <a:spAutoFit/>
+          </a:bodyPr>
+          <a:lstStyle/>
+          <a:p>
+            <a:r>
+              <a:rPr lang="es-ES" sz="4000" dirty="0"/>
+              <a:t>x</a:t>
+            </a:r>
+            <a:r>
+              <a:rPr lang="es-ES" sz="4000" baseline="-25000" dirty="0"/>
+              <a:t>2</a:t>
+            </a:r>
+          </a:p>
+        </p:txBody>
+      </p:sp>
+      <p:sp>
+        <p:nvSpPr>
+          <p:cNvPr id="10" name="Elipse 9">
+            <a:extLst>
+              <a:ext uri="{FF2B5EF4-FFF2-40B4-BE49-F238E27FC236}">
+                <a16:creationId xmlns:a16="http://schemas.microsoft.com/office/drawing/2014/main" id="{FAF1A3FD-51DB-4C3C-8EC8-2E709831A005}"/>
+              </a:ext>
+            </a:extLst>
+          </p:cNvPr>
+          <p:cNvSpPr/>
+          <p:nvPr/>
+        </p:nvSpPr>
+        <p:spPr>
+          <a:xfrm>
+            <a:off x="4034117" y="833886"/>
+            <a:ext cx="2160000" cy="2160000"/>
+          </a:xfrm>
+          <a:prstGeom prst="ellipse">
+            <a:avLst/>
+          </a:prstGeom>
+          <a:noFill/>
+          <a:ln w="38100">
+            <a:solidFill>
+              <a:schemeClr val="tx1"/>
+            </a:solidFill>
+          </a:ln>
+        </p:spPr>
+        <p:style>
+          <a:lnRef idx="2">
+            <a:schemeClr val="accent1">
+              <a:shade val="50000"/>
+            </a:schemeClr>
+          </a:lnRef>
+          <a:fillRef idx="1">
+            <a:schemeClr val="accent1"/>
+          </a:fillRef>
+          <a:effectRef idx="0">
+            <a:schemeClr val="accent1"/>
+          </a:effectRef>
+          <a:fontRef idx="minor">
+            <a:schemeClr val="lt1"/>
+          </a:fontRef>
+        </p:style>
+        <p:txBody>
+          <a:bodyPr rtlCol="0" anchor="ctr"/>
+          <a:lstStyle/>
+          <a:p>
+            <a:pPr algn="ctr"/>
+            <a:r>
+              <a:rPr lang="el-GR" sz="1400" dirty="0">
+                <a:solidFill>
+                  <a:schemeClr val="tx1"/>
+                </a:solidFill>
+              </a:rPr>
+              <a:t>ω</a:t>
+            </a:r>
+            <a:r>
+              <a:rPr lang="es-ES" sz="1400" baseline="-25000" dirty="0">
+                <a:solidFill>
+                  <a:schemeClr val="tx1"/>
+                </a:solidFill>
+              </a:rPr>
+              <a:t>10</a:t>
+            </a:r>
+            <a:r>
+              <a:rPr lang="es-ES" sz="1400" dirty="0">
+                <a:solidFill>
+                  <a:schemeClr val="tx1"/>
+                </a:solidFill>
+              </a:rPr>
+              <a:t>+</a:t>
+            </a:r>
+            <a:r>
+              <a:rPr lang="el-GR" sz="1400" dirty="0">
+                <a:solidFill>
+                  <a:schemeClr val="tx1"/>
+                </a:solidFill>
+              </a:rPr>
+              <a:t>ω</a:t>
+            </a:r>
+            <a:r>
+              <a:rPr lang="es-ES" sz="1400" baseline="-25000" dirty="0">
+                <a:solidFill>
+                  <a:schemeClr val="tx1"/>
+                </a:solidFill>
+              </a:rPr>
+              <a:t>11</a:t>
+            </a:r>
+            <a:r>
+              <a:rPr lang="es-ES" sz="1400" dirty="0">
+                <a:solidFill>
+                  <a:schemeClr val="tx1"/>
+                </a:solidFill>
+              </a:rPr>
+              <a:t>x</a:t>
+            </a:r>
+            <a:r>
+              <a:rPr lang="es-ES" sz="1400" baseline="-25000" dirty="0">
+                <a:solidFill>
+                  <a:schemeClr val="tx1"/>
+                </a:solidFill>
+              </a:rPr>
+              <a:t>1</a:t>
+            </a:r>
+            <a:r>
+              <a:rPr lang="es-ES" sz="1400" dirty="0">
+                <a:solidFill>
+                  <a:schemeClr val="tx1"/>
+                </a:solidFill>
+              </a:rPr>
+              <a:t>+</a:t>
+            </a:r>
+            <a:r>
+              <a:rPr lang="el-GR" sz="1400" dirty="0">
+                <a:solidFill>
+                  <a:schemeClr val="tx1"/>
+                </a:solidFill>
+              </a:rPr>
+              <a:t>ω</a:t>
+            </a:r>
+            <a:r>
+              <a:rPr lang="es-ES" sz="1400" baseline="-25000" dirty="0">
+                <a:solidFill>
+                  <a:schemeClr val="tx1"/>
+                </a:solidFill>
+              </a:rPr>
+              <a:t>12</a:t>
+            </a:r>
+            <a:r>
+              <a:rPr lang="es-ES" sz="1400" dirty="0">
+                <a:solidFill>
+                  <a:schemeClr val="tx1"/>
+                </a:solidFill>
+              </a:rPr>
+              <a:t>x</a:t>
+            </a:r>
+            <a:r>
+              <a:rPr lang="es-ES" sz="1400" baseline="-25000" dirty="0">
+                <a:solidFill>
+                  <a:schemeClr val="tx1"/>
+                </a:solidFill>
+              </a:rPr>
+              <a:t>2</a:t>
+            </a:r>
+          </a:p>
+        </p:txBody>
+      </p:sp>
+      <p:sp>
+        <p:nvSpPr>
+          <p:cNvPr id="12" name="Elipse 11">
+            <a:extLst>
+              <a:ext uri="{FF2B5EF4-FFF2-40B4-BE49-F238E27FC236}">
+                <a16:creationId xmlns:a16="http://schemas.microsoft.com/office/drawing/2014/main" id="{906303DC-A9C5-495C-BD99-1543AFDECB3C}"/>
+              </a:ext>
+            </a:extLst>
+          </p:cNvPr>
+          <p:cNvSpPr/>
+          <p:nvPr/>
+        </p:nvSpPr>
+        <p:spPr>
+          <a:xfrm>
+            <a:off x="4034117" y="3864114"/>
+            <a:ext cx="2160000" cy="2160000"/>
+          </a:xfrm>
+          <a:prstGeom prst="ellipse">
+            <a:avLst/>
+          </a:prstGeom>
+          <a:noFill/>
+          <a:ln w="38100">
+            <a:solidFill>
+              <a:schemeClr val="tx1"/>
+            </a:solidFill>
+          </a:ln>
+        </p:spPr>
+        <p:style>
+          <a:lnRef idx="2">
+            <a:schemeClr val="accent1">
+              <a:shade val="50000"/>
+            </a:schemeClr>
+          </a:lnRef>
+          <a:fillRef idx="1">
+            <a:schemeClr val="accent1"/>
+          </a:fillRef>
+          <a:effectRef idx="0">
+            <a:schemeClr val="accent1"/>
+          </a:effectRef>
+          <a:fontRef idx="minor">
+            <a:schemeClr val="lt1"/>
+          </a:fontRef>
+        </p:style>
+        <p:txBody>
+          <a:bodyPr rtlCol="0" anchor="ctr"/>
+          <a:lstStyle/>
+          <a:p>
+            <a:pPr algn="ctr"/>
+            <a:r>
+              <a:rPr lang="el-GR" sz="1400" dirty="0">
+                <a:solidFill>
+                  <a:schemeClr val="tx1"/>
+                </a:solidFill>
+              </a:rPr>
+              <a:t>ω</a:t>
+            </a:r>
+            <a:r>
+              <a:rPr lang="es-ES" sz="1400" baseline="-25000" dirty="0">
+                <a:solidFill>
+                  <a:schemeClr val="tx1"/>
+                </a:solidFill>
+              </a:rPr>
+              <a:t>20</a:t>
+            </a:r>
+            <a:r>
+              <a:rPr lang="es-ES" sz="1400" dirty="0">
+                <a:solidFill>
+                  <a:schemeClr val="tx1"/>
+                </a:solidFill>
+              </a:rPr>
+              <a:t>+</a:t>
+            </a:r>
+            <a:r>
+              <a:rPr lang="el-GR" sz="1400" dirty="0">
+                <a:solidFill>
+                  <a:schemeClr val="tx1"/>
+                </a:solidFill>
+              </a:rPr>
+              <a:t>ω</a:t>
+            </a:r>
+            <a:r>
+              <a:rPr lang="es-ES" sz="1400" baseline="-25000" dirty="0">
+                <a:solidFill>
+                  <a:schemeClr val="tx1"/>
+                </a:solidFill>
+              </a:rPr>
+              <a:t>21</a:t>
+            </a:r>
+            <a:r>
+              <a:rPr lang="es-ES" sz="1400" dirty="0">
+                <a:solidFill>
+                  <a:schemeClr val="tx1"/>
+                </a:solidFill>
+              </a:rPr>
+              <a:t>x</a:t>
+            </a:r>
+            <a:r>
+              <a:rPr lang="es-ES" sz="1400" baseline="-25000" dirty="0">
+                <a:solidFill>
+                  <a:schemeClr val="tx1"/>
+                </a:solidFill>
+              </a:rPr>
+              <a:t>1</a:t>
+            </a:r>
+            <a:r>
+              <a:rPr lang="es-ES" sz="1400" dirty="0">
+                <a:solidFill>
+                  <a:schemeClr val="tx1"/>
+                </a:solidFill>
+              </a:rPr>
+              <a:t>+</a:t>
+            </a:r>
+            <a:r>
+              <a:rPr lang="el-GR" sz="1400" dirty="0">
+                <a:solidFill>
+                  <a:schemeClr val="tx1"/>
+                </a:solidFill>
+              </a:rPr>
+              <a:t>ω</a:t>
+            </a:r>
+            <a:r>
+              <a:rPr lang="es-ES" sz="1400" baseline="-25000" dirty="0">
+                <a:solidFill>
+                  <a:schemeClr val="tx1"/>
+                </a:solidFill>
+              </a:rPr>
+              <a:t>22</a:t>
+            </a:r>
+            <a:r>
+              <a:rPr lang="es-ES" sz="1400" dirty="0">
+                <a:solidFill>
+                  <a:schemeClr val="tx1"/>
+                </a:solidFill>
+              </a:rPr>
+              <a:t>x</a:t>
+            </a:r>
+            <a:r>
+              <a:rPr lang="es-ES" sz="1400" baseline="-25000" dirty="0">
+                <a:solidFill>
+                  <a:schemeClr val="tx1"/>
+                </a:solidFill>
+              </a:rPr>
+              <a:t>2</a:t>
+            </a:r>
+          </a:p>
+        </p:txBody>
+      </p:sp>
+      <p:cxnSp>
+        <p:nvCxnSpPr>
+          <p:cNvPr id="17" name="Conector recto de flecha 16">
+            <a:extLst>
+              <a:ext uri="{FF2B5EF4-FFF2-40B4-BE49-F238E27FC236}">
+                <a16:creationId xmlns:a16="http://schemas.microsoft.com/office/drawing/2014/main" id="{8BE519EB-A5C9-43DF-966F-1E93046EFB52}"/>
+              </a:ext>
+            </a:extLst>
+          </p:cNvPr>
+          <p:cNvCxnSpPr>
+            <a:cxnSpLocks/>
+            <a:stCxn id="12" idx="2"/>
+            <a:endCxn id="5" idx="3"/>
+          </p:cNvCxnSpPr>
+          <p:nvPr/>
+        </p:nvCxnSpPr>
+        <p:spPr>
+          <a:xfrm flipH="1" flipV="1">
+            <a:off x="1945341" y="2057563"/>
+            <a:ext cx="2088776" cy="2886551"/>
+          </a:xfrm>
+          <a:prstGeom prst="straightConnector1">
+            <a:avLst/>
+          </a:prstGeom>
+          <a:ln w="28575">
+            <a:solidFill>
+              <a:schemeClr val="tx1"/>
+            </a:solidFill>
+            <a:headEnd type="triangle" w="med" len="med"/>
+            <a:tailEnd type="none" w="med" len="med"/>
+          </a:ln>
+        </p:spPr>
+        <p:style>
+          <a:lnRef idx="1">
+            <a:schemeClr val="accent1"/>
+          </a:lnRef>
+          <a:fillRef idx="0">
+            <a:schemeClr val="accent1"/>
+          </a:fillRef>
+          <a:effectRef idx="0">
+            <a:schemeClr val="accent1"/>
+          </a:effectRef>
+          <a:fontRef idx="minor">
+            <a:schemeClr val="tx1"/>
+          </a:fontRef>
+        </p:style>
+      </p:cxnSp>
+      <p:cxnSp>
+        <p:nvCxnSpPr>
+          <p:cNvPr id="20" name="Conector recto de flecha 19">
+            <a:extLst>
+              <a:ext uri="{FF2B5EF4-FFF2-40B4-BE49-F238E27FC236}">
+                <a16:creationId xmlns:a16="http://schemas.microsoft.com/office/drawing/2014/main" id="{F49DB218-980B-4186-889C-1F06146D8BC2}"/>
+              </a:ext>
+            </a:extLst>
+          </p:cNvPr>
+          <p:cNvCxnSpPr>
+            <a:cxnSpLocks/>
+            <a:endCxn id="9" idx="3"/>
+          </p:cNvCxnSpPr>
+          <p:nvPr/>
+        </p:nvCxnSpPr>
+        <p:spPr>
+          <a:xfrm flipH="1" flipV="1">
+            <a:off x="1945341" y="4280316"/>
+            <a:ext cx="1980705" cy="587519"/>
+          </a:xfrm>
+          <a:prstGeom prst="straightConnector1">
+            <a:avLst/>
+          </a:prstGeom>
+          <a:ln w="28575">
+            <a:solidFill>
+              <a:schemeClr val="tx1"/>
+            </a:solidFill>
+            <a:headEnd type="triangle" w="med" len="med"/>
+            <a:tailEnd type="none" w="med" len="med"/>
+          </a:ln>
+        </p:spPr>
+        <p:style>
+          <a:lnRef idx="1">
+            <a:schemeClr val="accent1"/>
+          </a:lnRef>
+          <a:fillRef idx="0">
+            <a:schemeClr val="accent1"/>
+          </a:fillRef>
+          <a:effectRef idx="0">
+            <a:schemeClr val="accent1"/>
+          </a:effectRef>
+          <a:fontRef idx="minor">
+            <a:schemeClr val="tx1"/>
+          </a:fontRef>
+        </p:style>
+      </p:cxnSp>
+      <p:sp>
+        <p:nvSpPr>
+          <p:cNvPr id="23" name="Elipse 22">
+            <a:extLst>
+              <a:ext uri="{FF2B5EF4-FFF2-40B4-BE49-F238E27FC236}">
+                <a16:creationId xmlns:a16="http://schemas.microsoft.com/office/drawing/2014/main" id="{7EB173AF-FF82-4D35-90C4-1204C93C5FF3}"/>
+              </a:ext>
+            </a:extLst>
+          </p:cNvPr>
+          <p:cNvSpPr/>
+          <p:nvPr/>
+        </p:nvSpPr>
+        <p:spPr>
+          <a:xfrm>
+            <a:off x="7077885" y="2411506"/>
+            <a:ext cx="2160000" cy="2160000"/>
+          </a:xfrm>
+          <a:prstGeom prst="ellipse">
+            <a:avLst/>
+          </a:prstGeom>
+          <a:noFill/>
+          <a:ln w="38100">
+            <a:solidFill>
+              <a:schemeClr val="tx1"/>
+            </a:solidFill>
+          </a:ln>
+        </p:spPr>
+        <p:style>
+          <a:lnRef idx="2">
+            <a:schemeClr val="accent1">
+              <a:shade val="50000"/>
+            </a:schemeClr>
+          </a:lnRef>
+          <a:fillRef idx="1">
+            <a:schemeClr val="accent1"/>
+          </a:fillRef>
+          <a:effectRef idx="0">
+            <a:schemeClr val="accent1"/>
+          </a:effectRef>
+          <a:fontRef idx="minor">
+            <a:schemeClr val="lt1"/>
+          </a:fontRef>
+        </p:style>
+        <p:txBody>
+          <a:bodyPr rtlCol="0" anchor="ctr"/>
+          <a:lstStyle/>
+          <a:p>
+            <a:pPr algn="ctr"/>
+            <a:r>
+              <a:rPr lang="el-GR" sz="1400" dirty="0">
+                <a:solidFill>
+                  <a:schemeClr val="tx1"/>
+                </a:solidFill>
+              </a:rPr>
+              <a:t>ω</a:t>
+            </a:r>
+            <a:r>
+              <a:rPr lang="es-ES" sz="1400" baseline="-25000" dirty="0">
+                <a:solidFill>
+                  <a:schemeClr val="tx1"/>
+                </a:solidFill>
+              </a:rPr>
+              <a:t>30</a:t>
+            </a:r>
+            <a:r>
+              <a:rPr lang="es-ES" sz="1400" dirty="0">
+                <a:solidFill>
+                  <a:schemeClr val="tx1"/>
+                </a:solidFill>
+              </a:rPr>
+              <a:t>+</a:t>
+            </a:r>
+            <a:r>
+              <a:rPr lang="el-GR" sz="1400" dirty="0">
+                <a:solidFill>
+                  <a:schemeClr val="tx1"/>
+                </a:solidFill>
+              </a:rPr>
+              <a:t>ω</a:t>
+            </a:r>
+            <a:r>
+              <a:rPr lang="es-ES" sz="1400" baseline="-25000" dirty="0">
+                <a:solidFill>
+                  <a:schemeClr val="tx1"/>
+                </a:solidFill>
+              </a:rPr>
+              <a:t>31</a:t>
+            </a:r>
+            <a:r>
+              <a:rPr lang="es-ES" sz="1400" dirty="0">
+                <a:solidFill>
+                  <a:schemeClr val="tx1"/>
+                </a:solidFill>
+              </a:rPr>
+              <a:t>z</a:t>
+            </a:r>
+            <a:r>
+              <a:rPr lang="es-ES" sz="1400" baseline="-25000" dirty="0">
+                <a:solidFill>
+                  <a:schemeClr val="tx1"/>
+                </a:solidFill>
+              </a:rPr>
+              <a:t>1</a:t>
+            </a:r>
+            <a:r>
+              <a:rPr lang="es-ES" sz="1400" dirty="0">
+                <a:solidFill>
+                  <a:schemeClr val="tx1"/>
+                </a:solidFill>
+              </a:rPr>
+              <a:t>+</a:t>
+            </a:r>
+            <a:r>
+              <a:rPr lang="el-GR" sz="1400" dirty="0">
+                <a:solidFill>
+                  <a:schemeClr val="tx1"/>
+                </a:solidFill>
+              </a:rPr>
+              <a:t>ω</a:t>
+            </a:r>
+            <a:r>
+              <a:rPr lang="es-ES" sz="1400" baseline="-25000" dirty="0">
+                <a:solidFill>
+                  <a:schemeClr val="tx1"/>
+                </a:solidFill>
+              </a:rPr>
+              <a:t>32</a:t>
+            </a:r>
+            <a:r>
+              <a:rPr lang="es-ES" sz="1400" dirty="0">
+                <a:solidFill>
+                  <a:schemeClr val="tx1"/>
+                </a:solidFill>
+              </a:rPr>
+              <a:t>z</a:t>
+            </a:r>
+            <a:r>
+              <a:rPr lang="es-ES" sz="1400" baseline="-25000" dirty="0">
+                <a:solidFill>
+                  <a:schemeClr val="tx1"/>
+                </a:solidFill>
+              </a:rPr>
+              <a:t>2</a:t>
+            </a:r>
+          </a:p>
+        </p:txBody>
+      </p:sp>
+      <p:cxnSp>
+        <p:nvCxnSpPr>
+          <p:cNvPr id="24" name="Conector recto de flecha 23">
+            <a:extLst>
+              <a:ext uri="{FF2B5EF4-FFF2-40B4-BE49-F238E27FC236}">
+                <a16:creationId xmlns:a16="http://schemas.microsoft.com/office/drawing/2014/main" id="{618A848B-09C2-4485-8CD1-BF7C7EB872BD}"/>
+              </a:ext>
+            </a:extLst>
+          </p:cNvPr>
+          <p:cNvCxnSpPr>
+            <a:cxnSpLocks/>
+            <a:stCxn id="23" idx="2"/>
+            <a:endCxn id="10" idx="6"/>
+          </p:cNvCxnSpPr>
+          <p:nvPr/>
+        </p:nvCxnSpPr>
+        <p:spPr>
+          <a:xfrm flipH="1" flipV="1">
+            <a:off x="6194117" y="1913886"/>
+            <a:ext cx="883768" cy="1577620"/>
+          </a:xfrm>
+          <a:prstGeom prst="straightConnector1">
+            <a:avLst/>
+          </a:prstGeom>
+          <a:ln w="28575">
+            <a:solidFill>
+              <a:schemeClr val="tx1"/>
+            </a:solidFill>
+            <a:headEnd type="triangle" w="med" len="med"/>
+            <a:tailEnd type="none" w="med" len="med"/>
+          </a:ln>
+        </p:spPr>
+        <p:style>
+          <a:lnRef idx="1">
+            <a:schemeClr val="accent1"/>
+          </a:lnRef>
+          <a:fillRef idx="0">
+            <a:schemeClr val="accent1"/>
+          </a:fillRef>
+          <a:effectRef idx="0">
+            <a:schemeClr val="accent1"/>
+          </a:effectRef>
+          <a:fontRef idx="minor">
+            <a:schemeClr val="tx1"/>
+          </a:fontRef>
+        </p:style>
+      </p:cxnSp>
+      <p:cxnSp>
+        <p:nvCxnSpPr>
+          <p:cNvPr id="27" name="Conector recto de flecha 26">
+            <a:extLst>
+              <a:ext uri="{FF2B5EF4-FFF2-40B4-BE49-F238E27FC236}">
+                <a16:creationId xmlns:a16="http://schemas.microsoft.com/office/drawing/2014/main" id="{5184869E-FEFA-4570-BB20-CB122DC93113}"/>
+              </a:ext>
+            </a:extLst>
+          </p:cNvPr>
+          <p:cNvCxnSpPr>
+            <a:cxnSpLocks/>
+            <a:stCxn id="23" idx="2"/>
+            <a:endCxn id="12" idx="6"/>
+          </p:cNvCxnSpPr>
+          <p:nvPr/>
+        </p:nvCxnSpPr>
+        <p:spPr>
+          <a:xfrm flipH="1">
+            <a:off x="6194117" y="3491506"/>
+            <a:ext cx="883768" cy="1452608"/>
+          </a:xfrm>
+          <a:prstGeom prst="straightConnector1">
+            <a:avLst/>
+          </a:prstGeom>
+          <a:ln w="28575">
+            <a:solidFill>
+              <a:schemeClr val="tx1"/>
+            </a:solidFill>
+            <a:headEnd type="triangle" w="med" len="med"/>
+            <a:tailEnd type="none" w="med" len="med"/>
+          </a:ln>
+        </p:spPr>
+        <p:style>
+          <a:lnRef idx="1">
+            <a:schemeClr val="accent1"/>
+          </a:lnRef>
+          <a:fillRef idx="0">
+            <a:schemeClr val="accent1"/>
+          </a:fillRef>
+          <a:effectRef idx="0">
+            <a:schemeClr val="accent1"/>
+          </a:effectRef>
+          <a:fontRef idx="minor">
+            <a:schemeClr val="tx1"/>
+          </a:fontRef>
+        </p:style>
+      </p:cxnSp>
+      <p:sp>
+        <p:nvSpPr>
+          <p:cNvPr id="32" name="CuadroTexto 31">
+            <a:extLst>
+              <a:ext uri="{FF2B5EF4-FFF2-40B4-BE49-F238E27FC236}">
+                <a16:creationId xmlns:a16="http://schemas.microsoft.com/office/drawing/2014/main" id="{D4B06ABD-54C3-49A9-8447-C76038D3CFB2}"/>
+              </a:ext>
+            </a:extLst>
+          </p:cNvPr>
+          <p:cNvSpPr txBox="1"/>
+          <p:nvPr/>
+        </p:nvSpPr>
+        <p:spPr>
+          <a:xfrm>
+            <a:off x="6423463" y="1454810"/>
+            <a:ext cx="654422" cy="707886"/>
+          </a:xfrm>
+          <a:prstGeom prst="rect">
+            <a:avLst/>
+          </a:prstGeom>
+          <a:noFill/>
+        </p:spPr>
+        <p:txBody>
+          <a:bodyPr wrap="square" rtlCol="0">
+            <a:spAutoFit/>
+          </a:bodyPr>
+          <a:lstStyle/>
+          <a:p>
+            <a:r>
+              <a:rPr lang="es-ES" sz="4000" dirty="0"/>
+              <a:t>z</a:t>
+            </a:r>
+            <a:r>
+              <a:rPr lang="es-ES" sz="4000" baseline="-25000" dirty="0"/>
+              <a:t>1</a:t>
+            </a:r>
+          </a:p>
+        </p:txBody>
+      </p:sp>
+      <p:sp>
+        <p:nvSpPr>
+          <p:cNvPr id="33" name="CuadroTexto 32">
+            <a:extLst>
+              <a:ext uri="{FF2B5EF4-FFF2-40B4-BE49-F238E27FC236}">
+                <a16:creationId xmlns:a16="http://schemas.microsoft.com/office/drawing/2014/main" id="{41D1D7E7-AAE1-464F-992B-DEAE93DE50BE}"/>
+              </a:ext>
+            </a:extLst>
+          </p:cNvPr>
+          <p:cNvSpPr txBox="1"/>
+          <p:nvPr/>
+        </p:nvSpPr>
+        <p:spPr>
+          <a:xfrm>
+            <a:off x="6446124" y="4513892"/>
+            <a:ext cx="654422" cy="707886"/>
+          </a:xfrm>
+          <a:prstGeom prst="rect">
+            <a:avLst/>
+          </a:prstGeom>
+          <a:noFill/>
+        </p:spPr>
+        <p:txBody>
+          <a:bodyPr wrap="square" rtlCol="0">
+            <a:spAutoFit/>
+          </a:bodyPr>
+          <a:lstStyle/>
+          <a:p>
+            <a:r>
+              <a:rPr lang="es-ES" sz="4000" dirty="0"/>
+              <a:t>z</a:t>
+            </a:r>
+            <a:r>
+              <a:rPr lang="es-ES" sz="4000" baseline="-25000" dirty="0"/>
+              <a:t>2</a:t>
+            </a:r>
+          </a:p>
+        </p:txBody>
+      </p:sp>
+    </p:spTree>
+    <p:extLst>
+      <p:ext uri="{BB962C8B-B14F-4D97-AF65-F5344CB8AC3E}">
+        <p14:creationId xmlns:p14="http://schemas.microsoft.com/office/powerpoint/2010/main" val="327462174"/>
+      </p:ext>
+    </p:extLst>
+  </p:cSld>
+  <p:clrMapOvr>
+    <a:masterClrMapping/>
+  </p:clrMapOvr>
+</p:sld>
+</file>
+
+<file path=ppt/slides/slide5.xml><?xml version="1.0" encoding="utf-8"?>
+<p:sld xmlns:a="http://schemas.openxmlformats.org/drawingml/2006/main" xmlns:r="http://schemas.openxmlformats.org/officeDocument/2006/relationships" xmlns:p="http://schemas.openxmlformats.org/presentationml/2006/main">
+  <p:cSld>
+    <p:spTree>
+      <p:nvGrpSpPr>
+        <p:cNvPr id="1" name=""/>
+        <p:cNvGrpSpPr/>
+        <p:nvPr/>
+      </p:nvGrpSpPr>
+      <p:grpSpPr>
+        <a:xfrm>
+          <a:off x="0" y="0"/>
+          <a:ext cx="0" cy="0"/>
+          <a:chOff x="0" y="0"/>
+          <a:chExt cx="0" cy="0"/>
+        </a:xfrm>
+      </p:grpSpPr>
+      <p:sp>
+        <p:nvSpPr>
+          <p:cNvPr id="2" name="Elipse 1">
+            <a:extLst>
+              <a:ext uri="{FF2B5EF4-FFF2-40B4-BE49-F238E27FC236}">
+                <a16:creationId xmlns:a16="http://schemas.microsoft.com/office/drawing/2014/main" id="{AC11B586-3E34-4BCB-A47F-F721AB676B25}"/>
+              </a:ext>
+            </a:extLst>
+          </p:cNvPr>
+          <p:cNvSpPr/>
+          <p:nvPr/>
+        </p:nvSpPr>
+        <p:spPr>
+          <a:xfrm>
+            <a:off x="4034117" y="2411506"/>
+            <a:ext cx="5118848" cy="2160000"/>
+          </a:xfrm>
+          <a:prstGeom prst="ellipse">
+            <a:avLst/>
+          </a:prstGeom>
+          <a:noFill/>
+          <a:ln w="38100">
+            <a:solidFill>
+              <a:schemeClr val="tx1"/>
+            </a:solidFill>
+          </a:ln>
+        </p:spPr>
+        <p:style>
+          <a:lnRef idx="2">
+            <a:schemeClr val="accent1">
+              <a:shade val="50000"/>
+            </a:schemeClr>
+          </a:lnRef>
+          <a:fillRef idx="1">
+            <a:schemeClr val="accent1"/>
+          </a:fillRef>
+          <a:effectRef idx="0">
+            <a:schemeClr val="accent1"/>
+          </a:effectRef>
+          <a:fontRef idx="minor">
+            <a:schemeClr val="lt1"/>
+          </a:fontRef>
+        </p:style>
+        <p:txBody>
+          <a:bodyPr rtlCol="0" anchor="ctr"/>
+          <a:lstStyle/>
+          <a:p>
+            <a:pPr algn="ctr"/>
+            <a:endParaRPr lang="es-ES" sz="4000" baseline="-25000" dirty="0">
+              <a:solidFill>
+                <a:schemeClr val="tx1"/>
+              </a:solidFill>
+            </a:endParaRPr>
+          </a:p>
+        </p:txBody>
+      </p:sp>
+      <p:cxnSp>
+        <p:nvCxnSpPr>
+          <p:cNvPr id="3" name="Conector recto de flecha 2">
+            <a:extLst>
+              <a:ext uri="{FF2B5EF4-FFF2-40B4-BE49-F238E27FC236}">
+                <a16:creationId xmlns:a16="http://schemas.microsoft.com/office/drawing/2014/main" id="{71A23ADC-0EF1-47E8-8245-AF7DFB056FC1}"/>
+              </a:ext>
+            </a:extLst>
+          </p:cNvPr>
+          <p:cNvCxnSpPr>
+            <a:cxnSpLocks/>
+            <a:stCxn id="2" idx="2"/>
+          </p:cNvCxnSpPr>
+          <p:nvPr/>
+        </p:nvCxnSpPr>
+        <p:spPr>
+          <a:xfrm flipH="1" flipV="1">
+            <a:off x="1667436" y="2348753"/>
+            <a:ext cx="2366681" cy="1142753"/>
+          </a:xfrm>
+          <a:prstGeom prst="straightConnector1">
+            <a:avLst/>
+          </a:prstGeom>
+          <a:ln w="28575">
+            <a:solidFill>
+              <a:schemeClr val="tx1"/>
+            </a:solidFill>
+            <a:headEnd type="triangle" w="med" len="med"/>
+            <a:tailEnd type="none" w="med" len="med"/>
+          </a:ln>
+        </p:spPr>
+        <p:style>
+          <a:lnRef idx="1">
+            <a:schemeClr val="accent1"/>
+          </a:lnRef>
+          <a:fillRef idx="0">
+            <a:schemeClr val="accent1"/>
+          </a:fillRef>
+          <a:effectRef idx="0">
+            <a:schemeClr val="accent1"/>
+          </a:effectRef>
+          <a:fontRef idx="minor">
+            <a:schemeClr val="tx1"/>
+          </a:fontRef>
+        </p:style>
+      </p:cxnSp>
+      <p:cxnSp>
+        <p:nvCxnSpPr>
+          <p:cNvPr id="4" name="Conector recto de flecha 3">
+            <a:extLst>
+              <a:ext uri="{FF2B5EF4-FFF2-40B4-BE49-F238E27FC236}">
+                <a16:creationId xmlns:a16="http://schemas.microsoft.com/office/drawing/2014/main" id="{6A0B19ED-3009-4486-A8CB-5DDD9C5B7320}"/>
+              </a:ext>
+            </a:extLst>
+          </p:cNvPr>
+          <p:cNvCxnSpPr>
+            <a:cxnSpLocks/>
+            <a:endCxn id="2" idx="6"/>
+          </p:cNvCxnSpPr>
+          <p:nvPr/>
+        </p:nvCxnSpPr>
+        <p:spPr>
+          <a:xfrm flipH="1">
+            <a:off x="9152965" y="3491506"/>
+            <a:ext cx="1846729" cy="0"/>
+          </a:xfrm>
+          <a:prstGeom prst="straightConnector1">
+            <a:avLst/>
+          </a:prstGeom>
+          <a:ln w="28575">
+            <a:solidFill>
+              <a:schemeClr val="tx1"/>
+            </a:solidFill>
+            <a:headEnd type="triangle" w="med" len="med"/>
+            <a:tailEnd type="none" w="med" len="med"/>
+          </a:ln>
+        </p:spPr>
+        <p:style>
+          <a:lnRef idx="1">
+            <a:schemeClr val="accent1"/>
+          </a:lnRef>
+          <a:fillRef idx="0">
+            <a:schemeClr val="accent1"/>
+          </a:fillRef>
+          <a:effectRef idx="0">
+            <a:schemeClr val="accent1"/>
+          </a:effectRef>
+          <a:fontRef idx="minor">
+            <a:schemeClr val="tx1"/>
+          </a:fontRef>
+        </p:style>
+      </p:cxnSp>
+      <p:sp>
+        <p:nvSpPr>
+          <p:cNvPr id="5" name="CuadroTexto 4">
+            <a:extLst>
+              <a:ext uri="{FF2B5EF4-FFF2-40B4-BE49-F238E27FC236}">
+                <a16:creationId xmlns:a16="http://schemas.microsoft.com/office/drawing/2014/main" id="{130B9DE1-D9A2-4CE3-A5B2-B1A612669B84}"/>
+              </a:ext>
+            </a:extLst>
+          </p:cNvPr>
+          <p:cNvSpPr txBox="1"/>
+          <p:nvPr/>
+        </p:nvSpPr>
+        <p:spPr>
+          <a:xfrm>
+            <a:off x="1290919" y="1703620"/>
+            <a:ext cx="1362636" cy="707886"/>
+          </a:xfrm>
+          <a:prstGeom prst="rect">
+            <a:avLst/>
+          </a:prstGeom>
+          <a:noFill/>
+        </p:spPr>
+        <p:txBody>
+          <a:bodyPr wrap="square" rtlCol="0">
+            <a:spAutoFit/>
+          </a:bodyPr>
+          <a:lstStyle/>
+          <a:p>
+            <a:r>
+              <a:rPr lang="es-ES" sz="4000" dirty="0"/>
+              <a:t>x</a:t>
+            </a:r>
+            <a:r>
+              <a:rPr lang="es-ES" sz="4000" baseline="-25000" dirty="0"/>
+              <a:t>1</a:t>
+            </a:r>
+          </a:p>
+        </p:txBody>
+      </p:sp>
+      <p:sp>
+        <p:nvSpPr>
+          <p:cNvPr id="6" name="CuadroTexto 5">
+            <a:extLst>
+              <a:ext uri="{FF2B5EF4-FFF2-40B4-BE49-F238E27FC236}">
+                <a16:creationId xmlns:a16="http://schemas.microsoft.com/office/drawing/2014/main" id="{CDDF8D08-3990-4633-BB4E-E1EA5EA15C44}"/>
+              </a:ext>
+            </a:extLst>
+          </p:cNvPr>
+          <p:cNvSpPr txBox="1"/>
+          <p:nvPr/>
+        </p:nvSpPr>
+        <p:spPr>
+          <a:xfrm>
+            <a:off x="9528987" y="2783620"/>
+            <a:ext cx="1362636" cy="707886"/>
+          </a:xfrm>
+          <a:prstGeom prst="rect">
+            <a:avLst/>
+          </a:prstGeom>
+          <a:noFill/>
+        </p:spPr>
+        <p:txBody>
+          <a:bodyPr wrap="square" rtlCol="0">
+            <a:spAutoFit/>
+          </a:bodyPr>
+          <a:lstStyle/>
+          <a:p>
+            <a:pPr algn="r"/>
+            <a:r>
+              <a:rPr lang="es-ES" sz="4000" dirty="0"/>
+              <a:t>z</a:t>
+            </a:r>
+          </a:p>
+        </p:txBody>
+      </p:sp>
+      <p:cxnSp>
+        <p:nvCxnSpPr>
+          <p:cNvPr id="8" name="Conector recto de flecha 7">
+            <a:extLst>
+              <a:ext uri="{FF2B5EF4-FFF2-40B4-BE49-F238E27FC236}">
+                <a16:creationId xmlns:a16="http://schemas.microsoft.com/office/drawing/2014/main" id="{9B590CAC-90FE-4740-85C8-8C7EFEF9FAA1}"/>
+              </a:ext>
+            </a:extLst>
+          </p:cNvPr>
+          <p:cNvCxnSpPr>
+            <a:cxnSpLocks/>
+          </p:cNvCxnSpPr>
+          <p:nvPr/>
+        </p:nvCxnSpPr>
+        <p:spPr>
+          <a:xfrm flipH="1">
+            <a:off x="1667436" y="3491506"/>
+            <a:ext cx="2366682" cy="1142753"/>
+          </a:xfrm>
+          <a:prstGeom prst="straightConnector1">
+            <a:avLst/>
+          </a:prstGeom>
+          <a:ln w="28575">
+            <a:solidFill>
+              <a:schemeClr val="tx1"/>
+            </a:solidFill>
+            <a:headEnd type="triangle" w="med" len="med"/>
+            <a:tailEnd type="none" w="med" len="med"/>
+          </a:ln>
+        </p:spPr>
+        <p:style>
+          <a:lnRef idx="1">
+            <a:schemeClr val="accent1"/>
+          </a:lnRef>
+          <a:fillRef idx="0">
+            <a:schemeClr val="accent1"/>
+          </a:fillRef>
+          <a:effectRef idx="0">
+            <a:schemeClr val="accent1"/>
+          </a:effectRef>
+          <a:fontRef idx="minor">
+            <a:schemeClr val="tx1"/>
+          </a:fontRef>
+        </p:style>
+      </p:cxnSp>
+      <p:sp>
+        <p:nvSpPr>
+          <p:cNvPr id="9" name="CuadroTexto 8">
+            <a:extLst>
+              <a:ext uri="{FF2B5EF4-FFF2-40B4-BE49-F238E27FC236}">
+                <a16:creationId xmlns:a16="http://schemas.microsoft.com/office/drawing/2014/main" id="{05304D7E-CD8F-40B1-8691-C42CE5657426}"/>
+              </a:ext>
+            </a:extLst>
+          </p:cNvPr>
+          <p:cNvSpPr txBox="1"/>
+          <p:nvPr/>
+        </p:nvSpPr>
+        <p:spPr>
+          <a:xfrm>
+            <a:off x="1192800" y="3926373"/>
+            <a:ext cx="1362636" cy="707886"/>
+          </a:xfrm>
+          <a:prstGeom prst="rect">
+            <a:avLst/>
+          </a:prstGeom>
+          <a:noFill/>
+        </p:spPr>
+        <p:txBody>
+          <a:bodyPr wrap="square" rtlCol="0">
+            <a:spAutoFit/>
+          </a:bodyPr>
+          <a:lstStyle/>
+          <a:p>
+            <a:r>
+              <a:rPr lang="es-ES" sz="4000" dirty="0"/>
+              <a:t>x</a:t>
+            </a:r>
+            <a:r>
+              <a:rPr lang="es-ES" sz="4000" baseline="-25000" dirty="0"/>
+              <a:t>2</a:t>
+            </a:r>
+          </a:p>
+        </p:txBody>
+      </p:sp>
+      <p:sp>
+        <p:nvSpPr>
+          <p:cNvPr id="7" name="CuadroTexto 6">
+            <a:extLst>
+              <a:ext uri="{FF2B5EF4-FFF2-40B4-BE49-F238E27FC236}">
+                <a16:creationId xmlns:a16="http://schemas.microsoft.com/office/drawing/2014/main" id="{838A9B24-256C-4E19-ABD8-AF26037062D2}"/>
+              </a:ext>
+            </a:extLst>
+          </p:cNvPr>
+          <p:cNvSpPr txBox="1"/>
+          <p:nvPr/>
+        </p:nvSpPr>
+        <p:spPr>
+          <a:xfrm>
+            <a:off x="4089397" y="3075057"/>
+            <a:ext cx="3640667" cy="707886"/>
+          </a:xfrm>
+          <a:prstGeom prst="rect">
+            <a:avLst/>
+          </a:prstGeom>
+          <a:noFill/>
+        </p:spPr>
+        <p:txBody>
+          <a:bodyPr wrap="square" rtlCol="0">
+            <a:spAutoFit/>
+          </a:bodyPr>
+          <a:lstStyle/>
+          <a:p>
+            <a:r>
+              <a:rPr lang="el-GR" sz="4000" dirty="0">
+                <a:solidFill>
+                  <a:schemeClr val="tx1"/>
+                </a:solidFill>
+              </a:rPr>
+              <a:t>ω</a:t>
+            </a:r>
+            <a:r>
+              <a:rPr lang="es-ES" sz="4000" dirty="0">
+                <a:solidFill>
+                  <a:schemeClr val="tx1"/>
+                </a:solidFill>
+              </a:rPr>
+              <a:t>0 + </a:t>
+            </a:r>
+            <a:r>
+              <a:rPr lang="el-GR" sz="4000" dirty="0">
+                <a:solidFill>
+                  <a:schemeClr val="tx1"/>
+                </a:solidFill>
+              </a:rPr>
+              <a:t>ω</a:t>
+            </a:r>
+            <a:r>
+              <a:rPr lang="es-ES" sz="4000" baseline="-25000" dirty="0">
+                <a:solidFill>
+                  <a:schemeClr val="tx1"/>
+                </a:solidFill>
+              </a:rPr>
+              <a:t>1</a:t>
+            </a:r>
+            <a:r>
+              <a:rPr lang="es-ES" sz="4000" dirty="0">
+                <a:solidFill>
+                  <a:schemeClr val="tx1"/>
+                </a:solidFill>
+              </a:rPr>
+              <a:t>x</a:t>
+            </a:r>
+            <a:r>
+              <a:rPr lang="es-ES" sz="4000" baseline="-25000" dirty="0">
+                <a:solidFill>
+                  <a:schemeClr val="tx1"/>
+                </a:solidFill>
+              </a:rPr>
+              <a:t>1</a:t>
+            </a:r>
+            <a:r>
+              <a:rPr lang="es-ES" sz="4000" dirty="0">
+                <a:solidFill>
+                  <a:schemeClr val="tx1"/>
+                </a:solidFill>
+              </a:rPr>
+              <a:t> + </a:t>
+            </a:r>
+            <a:r>
+              <a:rPr lang="el-GR" sz="4000" dirty="0">
+                <a:solidFill>
+                  <a:schemeClr val="tx1"/>
+                </a:solidFill>
+              </a:rPr>
+              <a:t>ω</a:t>
+            </a:r>
+            <a:r>
+              <a:rPr lang="es-ES" sz="4000" baseline="-25000" dirty="0">
+                <a:solidFill>
+                  <a:schemeClr val="tx1"/>
+                </a:solidFill>
+              </a:rPr>
+              <a:t>2</a:t>
+            </a:r>
+            <a:r>
+              <a:rPr lang="es-ES" sz="4000" dirty="0">
+                <a:solidFill>
+                  <a:schemeClr val="tx1"/>
+                </a:solidFill>
+              </a:rPr>
+              <a:t>x</a:t>
+            </a:r>
+            <a:r>
+              <a:rPr lang="es-ES" sz="4000" baseline="-25000" dirty="0">
+                <a:solidFill>
+                  <a:schemeClr val="tx1"/>
+                </a:solidFill>
+              </a:rPr>
+              <a:t>2</a:t>
+            </a:r>
+          </a:p>
+        </p:txBody>
+      </p:sp>
+      <p:cxnSp>
+        <p:nvCxnSpPr>
+          <p:cNvPr id="11" name="Conector recto 10">
+            <a:extLst>
+              <a:ext uri="{FF2B5EF4-FFF2-40B4-BE49-F238E27FC236}">
+                <a16:creationId xmlns:a16="http://schemas.microsoft.com/office/drawing/2014/main" id="{D6C9C5F1-92F9-48DF-837C-17DF19A0A739}"/>
+              </a:ext>
+            </a:extLst>
+          </p:cNvPr>
+          <p:cNvCxnSpPr/>
+          <p:nvPr/>
+        </p:nvCxnSpPr>
+        <p:spPr>
+          <a:xfrm>
+            <a:off x="7730064" y="2523068"/>
+            <a:ext cx="0" cy="1926000"/>
+          </a:xfrm>
+          <a:prstGeom prst="line">
+            <a:avLst/>
+          </a:prstGeom>
+          <a:ln w="28575">
+            <a:solidFill>
+              <a:schemeClr val="tx1"/>
+            </a:solidFill>
+          </a:ln>
+        </p:spPr>
+        <p:style>
+          <a:lnRef idx="1">
+            <a:schemeClr val="accent1"/>
+          </a:lnRef>
+          <a:fillRef idx="0">
+            <a:schemeClr val="accent1"/>
+          </a:fillRef>
+          <a:effectRef idx="0">
+            <a:schemeClr val="accent1"/>
+          </a:effectRef>
+          <a:fontRef idx="minor">
+            <a:schemeClr val="tx1"/>
+          </a:fontRef>
+        </p:style>
+      </p:cxnSp>
+      <p:sp>
+        <p:nvSpPr>
+          <p:cNvPr id="12" name="CuadroTexto 11">
+            <a:extLst>
+              <a:ext uri="{FF2B5EF4-FFF2-40B4-BE49-F238E27FC236}">
+                <a16:creationId xmlns:a16="http://schemas.microsoft.com/office/drawing/2014/main" id="{C6E89E5B-FB08-4141-BE20-883EE50F0556}"/>
+              </a:ext>
+            </a:extLst>
+          </p:cNvPr>
+          <p:cNvSpPr txBox="1"/>
+          <p:nvPr/>
+        </p:nvSpPr>
+        <p:spPr>
+          <a:xfrm>
+            <a:off x="7735533" y="3084184"/>
+            <a:ext cx="1541941" cy="707886"/>
+          </a:xfrm>
+          <a:prstGeom prst="rect">
+            <a:avLst/>
+          </a:prstGeom>
+          <a:noFill/>
+        </p:spPr>
+        <p:txBody>
+          <a:bodyPr wrap="square" rtlCol="0">
+            <a:spAutoFit/>
+          </a:bodyPr>
+          <a:lstStyle/>
+          <a:p>
+            <a:r>
+              <a:rPr lang="el-GR" sz="4000" dirty="0">
+                <a:solidFill>
+                  <a:schemeClr val="tx1"/>
+                </a:solidFill>
+              </a:rPr>
+              <a:t>σ</a:t>
+            </a:r>
+            <a:r>
+              <a:rPr lang="es-ES" sz="4000" dirty="0">
+                <a:solidFill>
+                  <a:schemeClr val="tx1"/>
+                </a:solidFill>
+              </a:rPr>
+              <a:t>= </a:t>
+            </a:r>
+            <a:r>
+              <a:rPr lang="es-ES" sz="4000" dirty="0"/>
+              <a:t>f(z)</a:t>
+            </a:r>
+            <a:endParaRPr lang="es-ES" sz="4000" baseline="-25000" dirty="0">
+              <a:solidFill>
+                <a:schemeClr val="tx1"/>
+              </a:solidFill>
+            </a:endParaRPr>
+          </a:p>
+        </p:txBody>
+      </p:sp>
+    </p:spTree>
+    <p:extLst>
+      <p:ext uri="{BB962C8B-B14F-4D97-AF65-F5344CB8AC3E}">
+        <p14:creationId xmlns:p14="http://schemas.microsoft.com/office/powerpoint/2010/main" val="1957664274"/>
+      </p:ext>
+    </p:extLst>
+  </p:cSld>
+  <p:clrMapOvr>
+    <a:masterClrMapping/>
+  </p:clrMapOvr>
+</p:sld>
+</file>
+
+<file path=ppt/slides/slide6.xml><?xml version="1.0" encoding="utf-8"?>
+<p:sld xmlns:a="http://schemas.openxmlformats.org/drawingml/2006/main" xmlns:r="http://schemas.openxmlformats.org/officeDocument/2006/relationships" xmlns:p="http://schemas.openxmlformats.org/presentationml/2006/main">
+  <p:cSld>
+    <p:spTree>
+      <p:nvGrpSpPr>
+        <p:cNvPr id="1" name=""/>
+        <p:cNvGrpSpPr/>
+        <p:nvPr/>
+      </p:nvGrpSpPr>
+      <p:grpSpPr>
+        <a:xfrm>
+          <a:off x="0" y="0"/>
+          <a:ext cx="0" cy="0"/>
+          <a:chOff x="0" y="0"/>
+          <a:chExt cx="0" cy="0"/>
+        </a:xfrm>
+      </p:grpSpPr>
+      <p:cxnSp>
+        <p:nvCxnSpPr>
+          <p:cNvPr id="3" name="Conector recto de flecha 2">
+            <a:extLst>
+              <a:ext uri="{FF2B5EF4-FFF2-40B4-BE49-F238E27FC236}">
+                <a16:creationId xmlns:a16="http://schemas.microsoft.com/office/drawing/2014/main" id="{71A23ADC-0EF1-47E8-8245-AF7DFB056FC1}"/>
+              </a:ext>
+            </a:extLst>
+          </p:cNvPr>
+          <p:cNvCxnSpPr>
+            <a:cxnSpLocks/>
+            <a:stCxn id="10" idx="2"/>
+            <a:endCxn id="5" idx="3"/>
+          </p:cNvCxnSpPr>
+          <p:nvPr/>
+        </p:nvCxnSpPr>
+        <p:spPr>
+          <a:xfrm flipH="1">
+            <a:off x="1945341" y="1913886"/>
+            <a:ext cx="2088776" cy="143677"/>
+          </a:xfrm>
+          <a:prstGeom prst="straightConnector1">
+            <a:avLst/>
+          </a:prstGeom>
+          <a:ln w="28575">
+            <a:solidFill>
+              <a:schemeClr val="tx1"/>
+            </a:solidFill>
+            <a:headEnd type="triangle" w="med" len="med"/>
+            <a:tailEnd type="none" w="med" len="med"/>
+          </a:ln>
+        </p:spPr>
+        <p:style>
+          <a:lnRef idx="1">
+            <a:schemeClr val="accent1"/>
+          </a:lnRef>
+          <a:fillRef idx="0">
+            <a:schemeClr val="accent1"/>
+          </a:fillRef>
+          <a:effectRef idx="0">
+            <a:schemeClr val="accent1"/>
+          </a:effectRef>
+          <a:fontRef idx="minor">
+            <a:schemeClr val="tx1"/>
+          </a:fontRef>
+        </p:style>
+      </p:cxnSp>
+      <p:cxnSp>
+        <p:nvCxnSpPr>
+          <p:cNvPr id="4" name="Conector recto de flecha 3">
+            <a:extLst>
+              <a:ext uri="{FF2B5EF4-FFF2-40B4-BE49-F238E27FC236}">
+                <a16:creationId xmlns:a16="http://schemas.microsoft.com/office/drawing/2014/main" id="{6A0B19ED-3009-4486-A8CB-5DDD9C5B7320}"/>
+              </a:ext>
+            </a:extLst>
+          </p:cNvPr>
+          <p:cNvCxnSpPr>
+            <a:cxnSpLocks/>
+            <a:endCxn id="23" idx="6"/>
+          </p:cNvCxnSpPr>
+          <p:nvPr/>
+        </p:nvCxnSpPr>
+        <p:spPr>
+          <a:xfrm flipH="1">
+            <a:off x="9237885" y="3491506"/>
+            <a:ext cx="1761809" cy="0"/>
+          </a:xfrm>
+          <a:prstGeom prst="straightConnector1">
+            <a:avLst/>
+          </a:prstGeom>
+          <a:ln w="28575">
+            <a:solidFill>
+              <a:schemeClr val="tx1"/>
+            </a:solidFill>
+            <a:headEnd type="triangle" w="med" len="med"/>
+            <a:tailEnd type="none" w="med" len="med"/>
+          </a:ln>
+        </p:spPr>
+        <p:style>
+          <a:lnRef idx="1">
+            <a:schemeClr val="accent1"/>
+          </a:lnRef>
+          <a:fillRef idx="0">
+            <a:schemeClr val="accent1"/>
+          </a:fillRef>
+          <a:effectRef idx="0">
+            <a:schemeClr val="accent1"/>
+          </a:effectRef>
+          <a:fontRef idx="minor">
+            <a:schemeClr val="tx1"/>
+          </a:fontRef>
+        </p:style>
+      </p:cxnSp>
+      <p:sp>
+        <p:nvSpPr>
+          <p:cNvPr id="5" name="CuadroTexto 4">
+            <a:extLst>
+              <a:ext uri="{FF2B5EF4-FFF2-40B4-BE49-F238E27FC236}">
+                <a16:creationId xmlns:a16="http://schemas.microsoft.com/office/drawing/2014/main" id="{130B9DE1-D9A2-4CE3-A5B2-B1A612669B84}"/>
+              </a:ext>
+            </a:extLst>
+          </p:cNvPr>
+          <p:cNvSpPr txBox="1"/>
+          <p:nvPr/>
+        </p:nvSpPr>
+        <p:spPr>
+          <a:xfrm>
+            <a:off x="1290919" y="1703620"/>
+            <a:ext cx="654422" cy="707886"/>
+          </a:xfrm>
+          <a:prstGeom prst="rect">
+            <a:avLst/>
+          </a:prstGeom>
+          <a:noFill/>
+        </p:spPr>
+        <p:txBody>
+          <a:bodyPr wrap="square" rtlCol="0">
+            <a:spAutoFit/>
+          </a:bodyPr>
+          <a:lstStyle/>
+          <a:p>
+            <a:r>
+              <a:rPr lang="es-ES" sz="4000" dirty="0"/>
+              <a:t>x</a:t>
+            </a:r>
+            <a:r>
+              <a:rPr lang="es-ES" sz="4000" baseline="-25000" dirty="0"/>
+              <a:t>1</a:t>
+            </a:r>
+          </a:p>
+        </p:txBody>
+      </p:sp>
+      <p:sp>
+        <p:nvSpPr>
+          <p:cNvPr id="6" name="CuadroTexto 5">
+            <a:extLst>
+              <a:ext uri="{FF2B5EF4-FFF2-40B4-BE49-F238E27FC236}">
+                <a16:creationId xmlns:a16="http://schemas.microsoft.com/office/drawing/2014/main" id="{CDDF8D08-3990-4633-BB4E-E1EA5EA15C44}"/>
+              </a:ext>
+            </a:extLst>
+          </p:cNvPr>
+          <p:cNvSpPr txBox="1"/>
+          <p:nvPr/>
+        </p:nvSpPr>
+        <p:spPr>
+          <a:xfrm>
+            <a:off x="10452847" y="2783620"/>
+            <a:ext cx="438776" cy="707886"/>
+          </a:xfrm>
+          <a:prstGeom prst="rect">
+            <a:avLst/>
+          </a:prstGeom>
+          <a:noFill/>
+        </p:spPr>
+        <p:txBody>
+          <a:bodyPr wrap="square" rtlCol="0">
+            <a:spAutoFit/>
+          </a:bodyPr>
+          <a:lstStyle/>
+          <a:p>
+            <a:pPr algn="r"/>
+            <a:r>
+              <a:rPr lang="es-ES" sz="4000" dirty="0"/>
+              <a:t>z</a:t>
+            </a:r>
+          </a:p>
+        </p:txBody>
+      </p:sp>
+      <p:cxnSp>
+        <p:nvCxnSpPr>
+          <p:cNvPr id="8" name="Conector recto de flecha 7">
+            <a:extLst>
+              <a:ext uri="{FF2B5EF4-FFF2-40B4-BE49-F238E27FC236}">
+                <a16:creationId xmlns:a16="http://schemas.microsoft.com/office/drawing/2014/main" id="{9B590CAC-90FE-4740-85C8-8C7EFEF9FAA1}"/>
+              </a:ext>
+            </a:extLst>
+          </p:cNvPr>
+          <p:cNvCxnSpPr>
+            <a:cxnSpLocks/>
+            <a:stCxn id="10" idx="2"/>
+            <a:endCxn id="9" idx="3"/>
+          </p:cNvCxnSpPr>
+          <p:nvPr/>
+        </p:nvCxnSpPr>
+        <p:spPr>
+          <a:xfrm flipH="1">
+            <a:off x="1945341" y="1913886"/>
+            <a:ext cx="2088776" cy="2366430"/>
+          </a:xfrm>
+          <a:prstGeom prst="straightConnector1">
+            <a:avLst/>
+          </a:prstGeom>
+          <a:ln w="28575">
+            <a:solidFill>
+              <a:schemeClr val="tx1"/>
+            </a:solidFill>
+            <a:headEnd type="triangle" w="med" len="med"/>
+            <a:tailEnd type="none" w="med" len="med"/>
+          </a:ln>
+        </p:spPr>
+        <p:style>
+          <a:lnRef idx="1">
+            <a:schemeClr val="accent1"/>
+          </a:lnRef>
+          <a:fillRef idx="0">
+            <a:schemeClr val="accent1"/>
+          </a:fillRef>
+          <a:effectRef idx="0">
+            <a:schemeClr val="accent1"/>
+          </a:effectRef>
+          <a:fontRef idx="minor">
+            <a:schemeClr val="tx1"/>
+          </a:fontRef>
+        </p:style>
+      </p:cxnSp>
+      <p:sp>
+        <p:nvSpPr>
+          <p:cNvPr id="9" name="CuadroTexto 8">
+            <a:extLst>
+              <a:ext uri="{FF2B5EF4-FFF2-40B4-BE49-F238E27FC236}">
+                <a16:creationId xmlns:a16="http://schemas.microsoft.com/office/drawing/2014/main" id="{05304D7E-CD8F-40B1-8691-C42CE5657426}"/>
+              </a:ext>
+            </a:extLst>
+          </p:cNvPr>
+          <p:cNvSpPr txBox="1"/>
+          <p:nvPr/>
+        </p:nvSpPr>
+        <p:spPr>
+          <a:xfrm>
+            <a:off x="1192800" y="3926373"/>
+            <a:ext cx="752541" cy="707886"/>
+          </a:xfrm>
+          <a:prstGeom prst="rect">
+            <a:avLst/>
+          </a:prstGeom>
+          <a:noFill/>
+        </p:spPr>
+        <p:txBody>
+          <a:bodyPr wrap="square" rtlCol="0">
+            <a:spAutoFit/>
+          </a:bodyPr>
+          <a:lstStyle/>
+          <a:p>
+            <a:r>
+              <a:rPr lang="es-ES" sz="4000" dirty="0"/>
+              <a:t>x</a:t>
+            </a:r>
+            <a:r>
+              <a:rPr lang="es-ES" sz="4000" baseline="-25000" dirty="0"/>
+              <a:t>2</a:t>
+            </a:r>
+          </a:p>
+        </p:txBody>
+      </p:sp>
+      <p:sp>
+        <p:nvSpPr>
+          <p:cNvPr id="10" name="Elipse 9">
+            <a:extLst>
+              <a:ext uri="{FF2B5EF4-FFF2-40B4-BE49-F238E27FC236}">
+                <a16:creationId xmlns:a16="http://schemas.microsoft.com/office/drawing/2014/main" id="{FAF1A3FD-51DB-4C3C-8EC8-2E709831A005}"/>
+              </a:ext>
+            </a:extLst>
+          </p:cNvPr>
+          <p:cNvSpPr/>
+          <p:nvPr/>
+        </p:nvSpPr>
+        <p:spPr>
+          <a:xfrm>
+            <a:off x="4034117" y="833886"/>
+            <a:ext cx="2160000" cy="2160000"/>
+          </a:xfrm>
+          <a:prstGeom prst="ellipse">
+            <a:avLst/>
+          </a:prstGeom>
+          <a:noFill/>
+          <a:ln w="38100">
+            <a:solidFill>
+              <a:schemeClr val="tx1"/>
+            </a:solidFill>
+          </a:ln>
+        </p:spPr>
+        <p:style>
+          <a:lnRef idx="2">
+            <a:schemeClr val="accent1">
+              <a:shade val="50000"/>
+            </a:schemeClr>
+          </a:lnRef>
+          <a:fillRef idx="1">
+            <a:schemeClr val="accent1"/>
+          </a:fillRef>
+          <a:effectRef idx="0">
+            <a:schemeClr val="accent1"/>
+          </a:effectRef>
+          <a:fontRef idx="minor">
+            <a:schemeClr val="lt1"/>
+          </a:fontRef>
+        </p:style>
+        <p:txBody>
+          <a:bodyPr rtlCol="0" anchor="ctr"/>
+          <a:lstStyle/>
+          <a:p>
+            <a:pPr algn="ctr"/>
+            <a:endParaRPr lang="es-ES" sz="1400" baseline="-25000" dirty="0">
+              <a:solidFill>
+                <a:schemeClr val="tx1"/>
+              </a:solidFill>
+            </a:endParaRPr>
+          </a:p>
+        </p:txBody>
+      </p:sp>
+      <p:sp>
+        <p:nvSpPr>
+          <p:cNvPr id="12" name="Elipse 11">
+            <a:extLst>
+              <a:ext uri="{FF2B5EF4-FFF2-40B4-BE49-F238E27FC236}">
+                <a16:creationId xmlns:a16="http://schemas.microsoft.com/office/drawing/2014/main" id="{906303DC-A9C5-495C-BD99-1543AFDECB3C}"/>
+              </a:ext>
+            </a:extLst>
+          </p:cNvPr>
+          <p:cNvSpPr/>
+          <p:nvPr/>
+        </p:nvSpPr>
+        <p:spPr>
+          <a:xfrm>
+            <a:off x="4034117" y="3864114"/>
+            <a:ext cx="2160000" cy="2160000"/>
+          </a:xfrm>
+          <a:prstGeom prst="ellipse">
+            <a:avLst/>
+          </a:prstGeom>
+          <a:noFill/>
+          <a:ln w="38100">
+            <a:solidFill>
+              <a:schemeClr val="tx1"/>
+            </a:solidFill>
+          </a:ln>
+        </p:spPr>
+        <p:style>
+          <a:lnRef idx="2">
+            <a:schemeClr val="accent1">
+              <a:shade val="50000"/>
+            </a:schemeClr>
+          </a:lnRef>
+          <a:fillRef idx="1">
+            <a:schemeClr val="accent1"/>
+          </a:fillRef>
+          <a:effectRef idx="0">
+            <a:schemeClr val="accent1"/>
+          </a:effectRef>
+          <a:fontRef idx="minor">
+            <a:schemeClr val="lt1"/>
+          </a:fontRef>
+        </p:style>
+        <p:txBody>
+          <a:bodyPr rtlCol="0" anchor="ctr"/>
+          <a:lstStyle/>
+          <a:p>
+            <a:pPr algn="ctr"/>
+            <a:endParaRPr lang="es-ES" sz="1400" baseline="-25000" dirty="0">
+              <a:solidFill>
+                <a:schemeClr val="tx1"/>
+              </a:solidFill>
+            </a:endParaRPr>
+          </a:p>
+        </p:txBody>
+      </p:sp>
+      <p:cxnSp>
+        <p:nvCxnSpPr>
+          <p:cNvPr id="17" name="Conector recto de flecha 16">
+            <a:extLst>
+              <a:ext uri="{FF2B5EF4-FFF2-40B4-BE49-F238E27FC236}">
+                <a16:creationId xmlns:a16="http://schemas.microsoft.com/office/drawing/2014/main" id="{8BE519EB-A5C9-43DF-966F-1E93046EFB52}"/>
+              </a:ext>
+            </a:extLst>
+          </p:cNvPr>
+          <p:cNvCxnSpPr>
+            <a:cxnSpLocks/>
+            <a:stCxn id="12" idx="2"/>
+            <a:endCxn id="5" idx="3"/>
+          </p:cNvCxnSpPr>
+          <p:nvPr/>
+        </p:nvCxnSpPr>
+        <p:spPr>
+          <a:xfrm flipH="1" flipV="1">
+            <a:off x="1945341" y="2057563"/>
+            <a:ext cx="2088776" cy="2886551"/>
+          </a:xfrm>
+          <a:prstGeom prst="straightConnector1">
+            <a:avLst/>
+          </a:prstGeom>
+          <a:ln w="28575">
+            <a:solidFill>
+              <a:schemeClr val="tx1"/>
+            </a:solidFill>
+            <a:headEnd type="triangle" w="med" len="med"/>
+            <a:tailEnd type="none" w="med" len="med"/>
+          </a:ln>
+        </p:spPr>
+        <p:style>
+          <a:lnRef idx="1">
+            <a:schemeClr val="accent1"/>
+          </a:lnRef>
+          <a:fillRef idx="0">
+            <a:schemeClr val="accent1"/>
+          </a:fillRef>
+          <a:effectRef idx="0">
+            <a:schemeClr val="accent1"/>
+          </a:effectRef>
+          <a:fontRef idx="minor">
+            <a:schemeClr val="tx1"/>
+          </a:fontRef>
+        </p:style>
+      </p:cxnSp>
+      <p:cxnSp>
+        <p:nvCxnSpPr>
+          <p:cNvPr id="20" name="Conector recto de flecha 19">
+            <a:extLst>
+              <a:ext uri="{FF2B5EF4-FFF2-40B4-BE49-F238E27FC236}">
+                <a16:creationId xmlns:a16="http://schemas.microsoft.com/office/drawing/2014/main" id="{F49DB218-980B-4186-889C-1F06146D8BC2}"/>
+              </a:ext>
+            </a:extLst>
+          </p:cNvPr>
+          <p:cNvCxnSpPr>
+            <a:cxnSpLocks/>
+            <a:stCxn id="38" idx="1"/>
+            <a:endCxn id="9" idx="3"/>
+          </p:cNvCxnSpPr>
+          <p:nvPr/>
+        </p:nvCxnSpPr>
+        <p:spPr>
+          <a:xfrm flipH="1" flipV="1">
+            <a:off x="1945341" y="4280316"/>
+            <a:ext cx="2043951" cy="680775"/>
+          </a:xfrm>
+          <a:prstGeom prst="straightConnector1">
+            <a:avLst/>
+          </a:prstGeom>
+          <a:ln w="28575">
+            <a:solidFill>
+              <a:schemeClr val="tx1"/>
+            </a:solidFill>
+            <a:headEnd type="triangle" w="med" len="med"/>
+            <a:tailEnd type="none" w="med" len="med"/>
+          </a:ln>
+        </p:spPr>
+        <p:style>
+          <a:lnRef idx="1">
+            <a:schemeClr val="accent1"/>
+          </a:lnRef>
+          <a:fillRef idx="0">
+            <a:schemeClr val="accent1"/>
+          </a:fillRef>
+          <a:effectRef idx="0">
+            <a:schemeClr val="accent1"/>
+          </a:effectRef>
+          <a:fontRef idx="minor">
+            <a:schemeClr val="tx1"/>
+          </a:fontRef>
+        </p:style>
+      </p:cxnSp>
+      <p:sp>
+        <p:nvSpPr>
+          <p:cNvPr id="23" name="Elipse 22">
+            <a:extLst>
+              <a:ext uri="{FF2B5EF4-FFF2-40B4-BE49-F238E27FC236}">
+                <a16:creationId xmlns:a16="http://schemas.microsoft.com/office/drawing/2014/main" id="{7EB173AF-FF82-4D35-90C4-1204C93C5FF3}"/>
+              </a:ext>
+            </a:extLst>
+          </p:cNvPr>
+          <p:cNvSpPr/>
+          <p:nvPr/>
+        </p:nvSpPr>
+        <p:spPr>
+          <a:xfrm>
+            <a:off x="7077885" y="2411506"/>
+            <a:ext cx="2160000" cy="2160000"/>
+          </a:xfrm>
+          <a:prstGeom prst="ellipse">
+            <a:avLst/>
+          </a:prstGeom>
+          <a:noFill/>
+          <a:ln w="38100">
+            <a:solidFill>
+              <a:schemeClr val="tx1"/>
+            </a:solidFill>
+          </a:ln>
+        </p:spPr>
+        <p:style>
+          <a:lnRef idx="2">
+            <a:schemeClr val="accent1">
+              <a:shade val="50000"/>
+            </a:schemeClr>
+          </a:lnRef>
+          <a:fillRef idx="1">
+            <a:schemeClr val="accent1"/>
+          </a:fillRef>
+          <a:effectRef idx="0">
+            <a:schemeClr val="accent1"/>
+          </a:effectRef>
+          <a:fontRef idx="minor">
+            <a:schemeClr val="lt1"/>
+          </a:fontRef>
+        </p:style>
+        <p:txBody>
+          <a:bodyPr rtlCol="0" anchor="ctr"/>
+          <a:lstStyle/>
+          <a:p>
+            <a:pPr algn="ctr"/>
+            <a:endParaRPr lang="es-ES" sz="1400" baseline="-25000" dirty="0">
+              <a:solidFill>
+                <a:schemeClr val="tx1"/>
+              </a:solidFill>
+            </a:endParaRPr>
+          </a:p>
+        </p:txBody>
+      </p:sp>
+      <p:cxnSp>
+        <p:nvCxnSpPr>
+          <p:cNvPr id="24" name="Conector recto de flecha 23">
+            <a:extLst>
+              <a:ext uri="{FF2B5EF4-FFF2-40B4-BE49-F238E27FC236}">
+                <a16:creationId xmlns:a16="http://schemas.microsoft.com/office/drawing/2014/main" id="{618A848B-09C2-4485-8CD1-BF7C7EB872BD}"/>
+              </a:ext>
+            </a:extLst>
+          </p:cNvPr>
+          <p:cNvCxnSpPr>
+            <a:cxnSpLocks/>
+            <a:stCxn id="23" idx="2"/>
+            <a:endCxn id="10" idx="6"/>
+          </p:cNvCxnSpPr>
+          <p:nvPr/>
+        </p:nvCxnSpPr>
+        <p:spPr>
+          <a:xfrm flipH="1" flipV="1">
+            <a:off x="6194117" y="1913886"/>
+            <a:ext cx="883768" cy="1577620"/>
+          </a:xfrm>
+          <a:prstGeom prst="straightConnector1">
+            <a:avLst/>
+          </a:prstGeom>
+          <a:ln w="28575">
+            <a:solidFill>
+              <a:schemeClr val="tx1"/>
+            </a:solidFill>
+            <a:headEnd type="triangle" w="med" len="med"/>
+            <a:tailEnd type="none" w="med" len="med"/>
+          </a:ln>
+        </p:spPr>
+        <p:style>
+          <a:lnRef idx="1">
+            <a:schemeClr val="accent1"/>
+          </a:lnRef>
+          <a:fillRef idx="0">
+            <a:schemeClr val="accent1"/>
+          </a:fillRef>
+          <a:effectRef idx="0">
+            <a:schemeClr val="accent1"/>
+          </a:effectRef>
+          <a:fontRef idx="minor">
+            <a:schemeClr val="tx1"/>
+          </a:fontRef>
+        </p:style>
+      </p:cxnSp>
+      <p:cxnSp>
+        <p:nvCxnSpPr>
+          <p:cNvPr id="27" name="Conector recto de flecha 26">
+            <a:extLst>
+              <a:ext uri="{FF2B5EF4-FFF2-40B4-BE49-F238E27FC236}">
+                <a16:creationId xmlns:a16="http://schemas.microsoft.com/office/drawing/2014/main" id="{5184869E-FEFA-4570-BB20-CB122DC93113}"/>
+              </a:ext>
+            </a:extLst>
+          </p:cNvPr>
+          <p:cNvCxnSpPr>
+            <a:cxnSpLocks/>
+            <a:stCxn id="23" idx="2"/>
+            <a:endCxn id="12" idx="6"/>
+          </p:cNvCxnSpPr>
+          <p:nvPr/>
+        </p:nvCxnSpPr>
+        <p:spPr>
+          <a:xfrm flipH="1">
+            <a:off x="6194117" y="3491506"/>
+            <a:ext cx="883768" cy="1452608"/>
+          </a:xfrm>
+          <a:prstGeom prst="straightConnector1">
+            <a:avLst/>
+          </a:prstGeom>
+          <a:ln w="28575">
+            <a:solidFill>
+              <a:schemeClr val="tx1"/>
+            </a:solidFill>
+            <a:headEnd type="triangle" w="med" len="med"/>
+            <a:tailEnd type="none" w="med" len="med"/>
+          </a:ln>
+        </p:spPr>
+        <p:style>
+          <a:lnRef idx="1">
+            <a:schemeClr val="accent1"/>
+          </a:lnRef>
+          <a:fillRef idx="0">
+            <a:schemeClr val="accent1"/>
+          </a:fillRef>
+          <a:effectRef idx="0">
+            <a:schemeClr val="accent1"/>
+          </a:effectRef>
+          <a:fontRef idx="minor">
+            <a:schemeClr val="tx1"/>
+          </a:fontRef>
+        </p:style>
+      </p:cxnSp>
+      <p:sp>
+        <p:nvSpPr>
+          <p:cNvPr id="32" name="CuadroTexto 31">
+            <a:extLst>
+              <a:ext uri="{FF2B5EF4-FFF2-40B4-BE49-F238E27FC236}">
+                <a16:creationId xmlns:a16="http://schemas.microsoft.com/office/drawing/2014/main" id="{D4B06ABD-54C3-49A9-8447-C76038D3CFB2}"/>
+              </a:ext>
+            </a:extLst>
+          </p:cNvPr>
+          <p:cNvSpPr txBox="1"/>
+          <p:nvPr/>
+        </p:nvSpPr>
+        <p:spPr>
+          <a:xfrm>
+            <a:off x="6423463" y="1454810"/>
+            <a:ext cx="654422" cy="707886"/>
+          </a:xfrm>
+          <a:prstGeom prst="rect">
+            <a:avLst/>
+          </a:prstGeom>
+          <a:noFill/>
+        </p:spPr>
+        <p:txBody>
+          <a:bodyPr wrap="square" rtlCol="0">
+            <a:spAutoFit/>
+          </a:bodyPr>
+          <a:lstStyle/>
+          <a:p>
+            <a:r>
+              <a:rPr lang="el-GR" sz="4000" dirty="0">
+                <a:solidFill>
+                  <a:schemeClr val="tx1"/>
+                </a:solidFill>
+              </a:rPr>
+              <a:t>σ</a:t>
+            </a:r>
+            <a:r>
+              <a:rPr lang="es-ES" sz="4000" baseline="-25000" dirty="0"/>
+              <a:t>1</a:t>
+            </a:r>
+          </a:p>
+        </p:txBody>
+      </p:sp>
+      <p:sp>
+        <p:nvSpPr>
+          <p:cNvPr id="33" name="CuadroTexto 32">
+            <a:extLst>
+              <a:ext uri="{FF2B5EF4-FFF2-40B4-BE49-F238E27FC236}">
+                <a16:creationId xmlns:a16="http://schemas.microsoft.com/office/drawing/2014/main" id="{41D1D7E7-AAE1-464F-992B-DEAE93DE50BE}"/>
+              </a:ext>
+            </a:extLst>
+          </p:cNvPr>
+          <p:cNvSpPr txBox="1"/>
+          <p:nvPr/>
+        </p:nvSpPr>
+        <p:spPr>
+          <a:xfrm>
+            <a:off x="6446124" y="4513892"/>
+            <a:ext cx="654422" cy="707886"/>
+          </a:xfrm>
+          <a:prstGeom prst="rect">
+            <a:avLst/>
+          </a:prstGeom>
+          <a:noFill/>
+        </p:spPr>
+        <p:txBody>
+          <a:bodyPr wrap="square" rtlCol="0">
+            <a:spAutoFit/>
+          </a:bodyPr>
+          <a:lstStyle/>
+          <a:p>
+            <a:r>
+              <a:rPr lang="el-GR" sz="4000" dirty="0">
+                <a:solidFill>
+                  <a:schemeClr val="tx1"/>
+                </a:solidFill>
+              </a:rPr>
+              <a:t>σ</a:t>
+            </a:r>
+            <a:r>
+              <a:rPr lang="es-ES" sz="4000" baseline="-25000" dirty="0"/>
+              <a:t>2</a:t>
+            </a:r>
+          </a:p>
+        </p:txBody>
+      </p:sp>
+      <p:sp>
+        <p:nvSpPr>
+          <p:cNvPr id="7" name="CuadroTexto 6">
+            <a:extLst>
+              <a:ext uri="{FF2B5EF4-FFF2-40B4-BE49-F238E27FC236}">
+                <a16:creationId xmlns:a16="http://schemas.microsoft.com/office/drawing/2014/main" id="{117EBF4E-222D-44DD-8561-1EE223704B33}"/>
+              </a:ext>
+            </a:extLst>
+          </p:cNvPr>
+          <p:cNvSpPr txBox="1"/>
+          <p:nvPr/>
+        </p:nvSpPr>
+        <p:spPr>
+          <a:xfrm>
+            <a:off x="3989292" y="1759997"/>
+            <a:ext cx="1658473" cy="307777"/>
+          </a:xfrm>
+          <a:prstGeom prst="rect">
+            <a:avLst/>
+          </a:prstGeom>
+          <a:noFill/>
+        </p:spPr>
+        <p:txBody>
+          <a:bodyPr wrap="square" rtlCol="0">
+            <a:spAutoFit/>
+          </a:bodyPr>
+          <a:lstStyle/>
+          <a:p>
+            <a:r>
+              <a:rPr lang="es-ES" sz="1400" dirty="0">
+                <a:solidFill>
+                  <a:schemeClr val="tx1"/>
+                </a:solidFill>
+              </a:rPr>
+              <a:t>z</a:t>
+            </a:r>
+            <a:r>
+              <a:rPr lang="es-ES" sz="1400" baseline="-25000" dirty="0">
+                <a:solidFill>
+                  <a:schemeClr val="tx1"/>
+                </a:solidFill>
+              </a:rPr>
+              <a:t>1 </a:t>
+            </a:r>
+            <a:r>
+              <a:rPr lang="es-ES" sz="1400" dirty="0">
+                <a:solidFill>
+                  <a:schemeClr val="tx1"/>
+                </a:solidFill>
+              </a:rPr>
+              <a:t>=</a:t>
+            </a:r>
+            <a:r>
+              <a:rPr lang="el-GR" sz="1400" dirty="0">
+                <a:solidFill>
+                  <a:schemeClr val="tx1"/>
+                </a:solidFill>
+              </a:rPr>
+              <a:t>ω</a:t>
+            </a:r>
+            <a:r>
+              <a:rPr lang="es-ES" sz="1400" baseline="-25000" dirty="0">
+                <a:solidFill>
+                  <a:schemeClr val="tx1"/>
+                </a:solidFill>
+              </a:rPr>
+              <a:t>10</a:t>
+            </a:r>
+            <a:r>
+              <a:rPr lang="es-ES" sz="1400" dirty="0">
+                <a:solidFill>
+                  <a:schemeClr val="tx1"/>
+                </a:solidFill>
+              </a:rPr>
+              <a:t>+</a:t>
+            </a:r>
+            <a:r>
+              <a:rPr lang="el-GR" sz="1400" dirty="0">
+                <a:solidFill>
+                  <a:schemeClr val="tx1"/>
+                </a:solidFill>
+              </a:rPr>
+              <a:t>ω</a:t>
+            </a:r>
+            <a:r>
+              <a:rPr lang="es-ES" sz="1400" baseline="-25000" dirty="0">
+                <a:solidFill>
+                  <a:schemeClr val="tx1"/>
+                </a:solidFill>
+              </a:rPr>
+              <a:t>11</a:t>
+            </a:r>
+            <a:r>
+              <a:rPr lang="es-ES" sz="1400" dirty="0">
+                <a:solidFill>
+                  <a:schemeClr val="tx1"/>
+                </a:solidFill>
+              </a:rPr>
+              <a:t>x</a:t>
+            </a:r>
+            <a:r>
+              <a:rPr lang="es-ES" sz="1400" baseline="-25000" dirty="0">
+                <a:solidFill>
+                  <a:schemeClr val="tx1"/>
+                </a:solidFill>
+              </a:rPr>
+              <a:t>1</a:t>
+            </a:r>
+            <a:r>
+              <a:rPr lang="es-ES" sz="1400" dirty="0">
+                <a:solidFill>
+                  <a:schemeClr val="tx1"/>
+                </a:solidFill>
+              </a:rPr>
+              <a:t>+</a:t>
+            </a:r>
+            <a:r>
+              <a:rPr lang="el-GR" sz="1400" dirty="0">
+                <a:solidFill>
+                  <a:schemeClr val="tx1"/>
+                </a:solidFill>
+              </a:rPr>
+              <a:t>ω</a:t>
+            </a:r>
+            <a:r>
+              <a:rPr lang="es-ES" sz="1400" baseline="-25000" dirty="0">
+                <a:solidFill>
+                  <a:schemeClr val="tx1"/>
+                </a:solidFill>
+              </a:rPr>
+              <a:t>12</a:t>
+            </a:r>
+            <a:r>
+              <a:rPr lang="es-ES" sz="1400" dirty="0">
+                <a:solidFill>
+                  <a:schemeClr val="tx1"/>
+                </a:solidFill>
+              </a:rPr>
+              <a:t>x</a:t>
+            </a:r>
+            <a:r>
+              <a:rPr lang="es-ES" sz="1400" baseline="-25000" dirty="0">
+                <a:solidFill>
+                  <a:schemeClr val="tx1"/>
+                </a:solidFill>
+              </a:rPr>
+              <a:t>2</a:t>
+            </a:r>
+          </a:p>
+        </p:txBody>
+      </p:sp>
+      <p:cxnSp>
+        <p:nvCxnSpPr>
+          <p:cNvPr id="21" name="Conector recto 20">
+            <a:extLst>
+              <a:ext uri="{FF2B5EF4-FFF2-40B4-BE49-F238E27FC236}">
+                <a16:creationId xmlns:a16="http://schemas.microsoft.com/office/drawing/2014/main" id="{C7E1D02A-FA1C-4E50-AE70-DAB4A78D7490}"/>
+              </a:ext>
+            </a:extLst>
+          </p:cNvPr>
+          <p:cNvCxnSpPr/>
+          <p:nvPr/>
+        </p:nvCxnSpPr>
+        <p:spPr>
+          <a:xfrm>
+            <a:off x="5596468" y="941921"/>
+            <a:ext cx="0" cy="1944000"/>
+          </a:xfrm>
+          <a:prstGeom prst="line">
+            <a:avLst/>
+          </a:prstGeom>
+          <a:ln w="28575">
+            <a:solidFill>
+              <a:schemeClr val="tx1"/>
+            </a:solidFill>
+          </a:ln>
+        </p:spPr>
+        <p:style>
+          <a:lnRef idx="1">
+            <a:schemeClr val="accent1"/>
+          </a:lnRef>
+          <a:fillRef idx="0">
+            <a:schemeClr val="accent1"/>
+          </a:fillRef>
+          <a:effectRef idx="0">
+            <a:schemeClr val="accent1"/>
+          </a:effectRef>
+          <a:fontRef idx="minor">
+            <a:schemeClr val="tx1"/>
+          </a:fontRef>
+        </p:style>
+      </p:cxnSp>
+      <p:sp>
+        <p:nvSpPr>
+          <p:cNvPr id="22" name="CuadroTexto 21">
+            <a:extLst>
+              <a:ext uri="{FF2B5EF4-FFF2-40B4-BE49-F238E27FC236}">
+                <a16:creationId xmlns:a16="http://schemas.microsoft.com/office/drawing/2014/main" id="{DC6F45AC-448C-4C58-ADD7-05CF949DC412}"/>
+              </a:ext>
+            </a:extLst>
+          </p:cNvPr>
+          <p:cNvSpPr txBox="1"/>
+          <p:nvPr/>
+        </p:nvSpPr>
+        <p:spPr>
+          <a:xfrm>
+            <a:off x="5539193" y="1759997"/>
+            <a:ext cx="727131" cy="307777"/>
+          </a:xfrm>
+          <a:prstGeom prst="rect">
+            <a:avLst/>
+          </a:prstGeom>
+          <a:noFill/>
+        </p:spPr>
+        <p:txBody>
+          <a:bodyPr wrap="square" rtlCol="0">
+            <a:spAutoFit/>
+          </a:bodyPr>
+          <a:lstStyle/>
+          <a:p>
+            <a:r>
+              <a:rPr lang="el-GR" sz="1400" dirty="0">
+                <a:solidFill>
+                  <a:schemeClr val="tx1"/>
+                </a:solidFill>
+              </a:rPr>
+              <a:t>σ</a:t>
+            </a:r>
+            <a:r>
+              <a:rPr lang="es-ES" sz="1400" baseline="-25000" dirty="0">
+                <a:solidFill>
+                  <a:schemeClr val="tx1"/>
+                </a:solidFill>
+              </a:rPr>
+              <a:t>1</a:t>
+            </a:r>
+            <a:r>
+              <a:rPr lang="es-ES" sz="1400" dirty="0">
+                <a:solidFill>
+                  <a:schemeClr val="tx1"/>
+                </a:solidFill>
+              </a:rPr>
+              <a:t>=f(z</a:t>
+            </a:r>
+            <a:r>
+              <a:rPr lang="es-ES" sz="1400" baseline="-25000" dirty="0">
+                <a:solidFill>
+                  <a:schemeClr val="tx1"/>
+                </a:solidFill>
+              </a:rPr>
+              <a:t>1</a:t>
+            </a:r>
+            <a:r>
+              <a:rPr lang="es-ES" sz="1400" dirty="0">
+                <a:solidFill>
+                  <a:schemeClr val="tx1"/>
+                </a:solidFill>
+              </a:rPr>
+              <a:t>)</a:t>
+            </a:r>
+            <a:endParaRPr lang="es-ES" sz="1400" baseline="-25000" dirty="0">
+              <a:solidFill>
+                <a:schemeClr val="tx1"/>
+              </a:solidFill>
+            </a:endParaRPr>
+          </a:p>
+        </p:txBody>
+      </p:sp>
+      <p:sp>
+        <p:nvSpPr>
+          <p:cNvPr id="38" name="CuadroTexto 37">
+            <a:extLst>
+              <a:ext uri="{FF2B5EF4-FFF2-40B4-BE49-F238E27FC236}">
+                <a16:creationId xmlns:a16="http://schemas.microsoft.com/office/drawing/2014/main" id="{03936CF6-D253-46F2-AF76-525976183242}"/>
+              </a:ext>
+            </a:extLst>
+          </p:cNvPr>
+          <p:cNvSpPr txBox="1"/>
+          <p:nvPr/>
+        </p:nvSpPr>
+        <p:spPr>
+          <a:xfrm>
+            <a:off x="3989292" y="4807202"/>
+            <a:ext cx="1658473" cy="307777"/>
+          </a:xfrm>
+          <a:prstGeom prst="rect">
+            <a:avLst/>
+          </a:prstGeom>
+          <a:noFill/>
+        </p:spPr>
+        <p:txBody>
+          <a:bodyPr wrap="square" rtlCol="0">
+            <a:spAutoFit/>
+          </a:bodyPr>
+          <a:lstStyle/>
+          <a:p>
+            <a:r>
+              <a:rPr lang="es-ES" sz="1400" dirty="0">
+                <a:solidFill>
+                  <a:schemeClr val="tx1"/>
+                </a:solidFill>
+              </a:rPr>
+              <a:t>z</a:t>
+            </a:r>
+            <a:r>
+              <a:rPr lang="es-ES" sz="1400" baseline="-25000" dirty="0">
+                <a:solidFill>
+                  <a:schemeClr val="tx1"/>
+                </a:solidFill>
+              </a:rPr>
+              <a:t>2 </a:t>
+            </a:r>
+            <a:r>
+              <a:rPr lang="es-ES" sz="1400" dirty="0">
+                <a:solidFill>
+                  <a:schemeClr val="tx1"/>
+                </a:solidFill>
+              </a:rPr>
+              <a:t>=</a:t>
+            </a:r>
+            <a:r>
+              <a:rPr lang="el-GR" sz="1400" dirty="0">
+                <a:solidFill>
+                  <a:schemeClr val="tx1"/>
+                </a:solidFill>
+              </a:rPr>
+              <a:t>ω</a:t>
+            </a:r>
+            <a:r>
+              <a:rPr lang="es-ES" sz="1400" baseline="-25000" dirty="0"/>
+              <a:t>2</a:t>
+            </a:r>
+            <a:r>
+              <a:rPr lang="es-ES" sz="1400" baseline="-25000" dirty="0">
+                <a:solidFill>
+                  <a:schemeClr val="tx1"/>
+                </a:solidFill>
+              </a:rPr>
+              <a:t>0</a:t>
+            </a:r>
+            <a:r>
+              <a:rPr lang="es-ES" sz="1400" dirty="0">
+                <a:solidFill>
+                  <a:schemeClr val="tx1"/>
+                </a:solidFill>
+              </a:rPr>
+              <a:t>+</a:t>
+            </a:r>
+            <a:r>
+              <a:rPr lang="el-GR" sz="1400" dirty="0">
+                <a:solidFill>
+                  <a:schemeClr val="tx1"/>
+                </a:solidFill>
+              </a:rPr>
+              <a:t>ω</a:t>
+            </a:r>
+            <a:r>
+              <a:rPr lang="es-ES" sz="1400" baseline="-25000" dirty="0"/>
+              <a:t>2</a:t>
+            </a:r>
+            <a:r>
+              <a:rPr lang="es-ES" sz="1400" baseline="-25000" dirty="0">
+                <a:solidFill>
+                  <a:schemeClr val="tx1"/>
+                </a:solidFill>
+              </a:rPr>
+              <a:t>1</a:t>
+            </a:r>
+            <a:r>
+              <a:rPr lang="es-ES" sz="1400" dirty="0">
+                <a:solidFill>
+                  <a:schemeClr val="tx1"/>
+                </a:solidFill>
+              </a:rPr>
+              <a:t>x</a:t>
+            </a:r>
+            <a:r>
+              <a:rPr lang="es-ES" sz="1400" baseline="-25000" dirty="0">
+                <a:solidFill>
+                  <a:schemeClr val="tx1"/>
+                </a:solidFill>
+              </a:rPr>
+              <a:t>1</a:t>
+            </a:r>
+            <a:r>
+              <a:rPr lang="es-ES" sz="1400" dirty="0">
+                <a:solidFill>
+                  <a:schemeClr val="tx1"/>
+                </a:solidFill>
+              </a:rPr>
+              <a:t>+</a:t>
+            </a:r>
+            <a:r>
+              <a:rPr lang="el-GR" sz="1400" dirty="0">
+                <a:solidFill>
+                  <a:schemeClr val="tx1"/>
+                </a:solidFill>
+              </a:rPr>
+              <a:t>ω</a:t>
+            </a:r>
+            <a:r>
+              <a:rPr lang="es-ES" sz="1400" baseline="-25000" dirty="0"/>
+              <a:t>2</a:t>
+            </a:r>
+            <a:r>
+              <a:rPr lang="es-ES" sz="1400" baseline="-25000" dirty="0">
+                <a:solidFill>
+                  <a:schemeClr val="tx1"/>
+                </a:solidFill>
+              </a:rPr>
+              <a:t>2</a:t>
+            </a:r>
+            <a:r>
+              <a:rPr lang="es-ES" sz="1400" dirty="0">
+                <a:solidFill>
+                  <a:schemeClr val="tx1"/>
+                </a:solidFill>
+              </a:rPr>
+              <a:t>x</a:t>
+            </a:r>
+            <a:r>
+              <a:rPr lang="es-ES" sz="1400" baseline="-25000" dirty="0">
+                <a:solidFill>
+                  <a:schemeClr val="tx1"/>
+                </a:solidFill>
+              </a:rPr>
+              <a:t>2</a:t>
+            </a:r>
+          </a:p>
+        </p:txBody>
+      </p:sp>
+      <p:cxnSp>
+        <p:nvCxnSpPr>
+          <p:cNvPr id="39" name="Conector recto 38">
+            <a:extLst>
+              <a:ext uri="{FF2B5EF4-FFF2-40B4-BE49-F238E27FC236}">
+                <a16:creationId xmlns:a16="http://schemas.microsoft.com/office/drawing/2014/main" id="{B3C0BB22-9AB8-4CCB-BB58-36BF71355C8F}"/>
+              </a:ext>
+            </a:extLst>
+          </p:cNvPr>
+          <p:cNvCxnSpPr/>
+          <p:nvPr/>
+        </p:nvCxnSpPr>
+        <p:spPr>
+          <a:xfrm>
+            <a:off x="5596468" y="3989126"/>
+            <a:ext cx="0" cy="1908000"/>
+          </a:xfrm>
+          <a:prstGeom prst="line">
+            <a:avLst/>
+          </a:prstGeom>
+          <a:ln w="28575">
+            <a:solidFill>
+              <a:schemeClr val="tx1"/>
+            </a:solidFill>
+          </a:ln>
+        </p:spPr>
+        <p:style>
+          <a:lnRef idx="1">
+            <a:schemeClr val="accent1"/>
+          </a:lnRef>
+          <a:fillRef idx="0">
+            <a:schemeClr val="accent1"/>
+          </a:fillRef>
+          <a:effectRef idx="0">
+            <a:schemeClr val="accent1"/>
+          </a:effectRef>
+          <a:fontRef idx="minor">
+            <a:schemeClr val="tx1"/>
+          </a:fontRef>
+        </p:style>
+      </p:cxnSp>
+      <p:sp>
+        <p:nvSpPr>
+          <p:cNvPr id="40" name="CuadroTexto 39">
+            <a:extLst>
+              <a:ext uri="{FF2B5EF4-FFF2-40B4-BE49-F238E27FC236}">
+                <a16:creationId xmlns:a16="http://schemas.microsoft.com/office/drawing/2014/main" id="{C24F473F-738E-48A3-9FAA-2942AA4A9E5E}"/>
+              </a:ext>
+            </a:extLst>
+          </p:cNvPr>
+          <p:cNvSpPr txBox="1"/>
+          <p:nvPr/>
+        </p:nvSpPr>
+        <p:spPr>
+          <a:xfrm>
+            <a:off x="5539193" y="4807202"/>
+            <a:ext cx="727131" cy="307777"/>
+          </a:xfrm>
+          <a:prstGeom prst="rect">
+            <a:avLst/>
+          </a:prstGeom>
+          <a:noFill/>
+        </p:spPr>
+        <p:txBody>
+          <a:bodyPr wrap="square" rtlCol="0">
+            <a:spAutoFit/>
+          </a:bodyPr>
+          <a:lstStyle/>
+          <a:p>
+            <a:r>
+              <a:rPr lang="el-GR" sz="1400" dirty="0">
+                <a:solidFill>
+                  <a:schemeClr val="tx1"/>
+                </a:solidFill>
+              </a:rPr>
+              <a:t>σ</a:t>
+            </a:r>
+            <a:r>
+              <a:rPr lang="es-ES" sz="1400" baseline="-25000" dirty="0">
+                <a:solidFill>
+                  <a:schemeClr val="tx1"/>
+                </a:solidFill>
+              </a:rPr>
+              <a:t>2</a:t>
+            </a:r>
+            <a:r>
+              <a:rPr lang="es-ES" sz="1400" dirty="0">
+                <a:solidFill>
+                  <a:schemeClr val="tx1"/>
+                </a:solidFill>
+              </a:rPr>
+              <a:t>=f(z</a:t>
+            </a:r>
+            <a:r>
+              <a:rPr lang="es-ES" sz="1400" baseline="-25000" dirty="0">
+                <a:solidFill>
+                  <a:schemeClr val="tx1"/>
+                </a:solidFill>
+              </a:rPr>
+              <a:t>2</a:t>
+            </a:r>
+            <a:r>
+              <a:rPr lang="es-ES" sz="1400" dirty="0">
+                <a:solidFill>
+                  <a:schemeClr val="tx1"/>
+                </a:solidFill>
+              </a:rPr>
+              <a:t>)</a:t>
+            </a:r>
+            <a:endParaRPr lang="es-ES" sz="1400" baseline="-25000" dirty="0">
+              <a:solidFill>
+                <a:schemeClr val="tx1"/>
+              </a:solidFill>
+            </a:endParaRPr>
+          </a:p>
+        </p:txBody>
+      </p:sp>
+      <p:sp>
+        <p:nvSpPr>
+          <p:cNvPr id="43" name="CuadroTexto 42">
+            <a:extLst>
+              <a:ext uri="{FF2B5EF4-FFF2-40B4-BE49-F238E27FC236}">
+                <a16:creationId xmlns:a16="http://schemas.microsoft.com/office/drawing/2014/main" id="{619692EC-44BE-4855-A09D-5D3EF8302ED4}"/>
+              </a:ext>
+            </a:extLst>
+          </p:cNvPr>
+          <p:cNvSpPr txBox="1"/>
+          <p:nvPr/>
+        </p:nvSpPr>
+        <p:spPr>
+          <a:xfrm>
+            <a:off x="7328648" y="3346949"/>
+            <a:ext cx="1658473" cy="307777"/>
+          </a:xfrm>
+          <a:prstGeom prst="rect">
+            <a:avLst/>
+          </a:prstGeom>
+          <a:noFill/>
+        </p:spPr>
+        <p:txBody>
+          <a:bodyPr wrap="square" rtlCol="0">
+            <a:spAutoFit/>
+          </a:bodyPr>
+          <a:lstStyle/>
+          <a:p>
+            <a:pPr algn="ctr"/>
+            <a:r>
+              <a:rPr lang="es-ES" sz="1400" dirty="0">
+                <a:solidFill>
+                  <a:schemeClr val="tx1"/>
+                </a:solidFill>
+              </a:rPr>
+              <a:t>z=</a:t>
+            </a:r>
+            <a:r>
+              <a:rPr lang="el-GR" sz="1400" dirty="0">
+                <a:solidFill>
+                  <a:schemeClr val="tx1"/>
+                </a:solidFill>
+              </a:rPr>
+              <a:t>ω</a:t>
+            </a:r>
+            <a:r>
+              <a:rPr lang="es-ES" sz="1400" baseline="-25000" dirty="0">
+                <a:solidFill>
+                  <a:schemeClr val="tx1"/>
+                </a:solidFill>
+              </a:rPr>
+              <a:t>30</a:t>
+            </a:r>
+            <a:r>
+              <a:rPr lang="es-ES" sz="1400" dirty="0">
+                <a:solidFill>
+                  <a:schemeClr val="tx1"/>
+                </a:solidFill>
+              </a:rPr>
+              <a:t>+</a:t>
+            </a:r>
+            <a:r>
+              <a:rPr lang="el-GR" sz="1400" dirty="0">
+                <a:solidFill>
+                  <a:schemeClr val="tx1"/>
+                </a:solidFill>
+              </a:rPr>
+              <a:t>ω</a:t>
+            </a:r>
+            <a:r>
+              <a:rPr lang="es-ES" sz="1400" baseline="-25000" dirty="0">
+                <a:solidFill>
+                  <a:schemeClr val="tx1"/>
+                </a:solidFill>
+              </a:rPr>
+              <a:t>31</a:t>
+            </a:r>
+            <a:r>
+              <a:rPr lang="el-GR" sz="1400" dirty="0">
+                <a:solidFill>
+                  <a:schemeClr val="tx1"/>
+                </a:solidFill>
+              </a:rPr>
+              <a:t>σ</a:t>
+            </a:r>
+            <a:r>
+              <a:rPr lang="es-ES" sz="1400" baseline="-25000" dirty="0">
+                <a:solidFill>
+                  <a:schemeClr val="tx1"/>
+                </a:solidFill>
+              </a:rPr>
+              <a:t>1</a:t>
+            </a:r>
+            <a:r>
+              <a:rPr lang="es-ES" sz="1400" dirty="0">
+                <a:solidFill>
+                  <a:schemeClr val="tx1"/>
+                </a:solidFill>
+              </a:rPr>
+              <a:t>+</a:t>
+            </a:r>
+            <a:r>
+              <a:rPr lang="el-GR" sz="1400" dirty="0">
+                <a:solidFill>
+                  <a:schemeClr val="tx1"/>
+                </a:solidFill>
+              </a:rPr>
+              <a:t>ω</a:t>
+            </a:r>
+            <a:r>
+              <a:rPr lang="es-ES" sz="1400" baseline="-25000" dirty="0">
+                <a:solidFill>
+                  <a:schemeClr val="tx1"/>
+                </a:solidFill>
+              </a:rPr>
+              <a:t>32</a:t>
+            </a:r>
+            <a:r>
+              <a:rPr lang="el-GR" sz="1400" dirty="0">
+                <a:solidFill>
+                  <a:schemeClr val="tx1"/>
+                </a:solidFill>
+              </a:rPr>
+              <a:t>σ</a:t>
+            </a:r>
+            <a:r>
+              <a:rPr lang="es-ES" sz="1400" baseline="-25000" dirty="0">
+                <a:solidFill>
+                  <a:schemeClr val="tx1"/>
+                </a:solidFill>
+              </a:rPr>
+              <a:t>2</a:t>
+            </a:r>
+          </a:p>
+        </p:txBody>
+      </p:sp>
+    </p:spTree>
+    <p:extLst>
+      <p:ext uri="{BB962C8B-B14F-4D97-AF65-F5344CB8AC3E}">
+        <p14:creationId xmlns:p14="http://schemas.microsoft.com/office/powerpoint/2010/main" val="2929768599"/>
+      </p:ext>
+    </p:extLst>
+  </p:cSld>
+  <p:clrMapOvr>
+    <a:masterClrMapping/>
+  </p:clrMapOvr>
+</p:sld>
+</file>
+
 <file path=ppt/theme/theme1.xml><?xml version="1.0" encoding="utf-8"?>
 <a:theme xmlns:a="http://schemas.openxmlformats.org/drawingml/2006/main" name="Tema de Office">
   <a:themeElements>

</xml_diff>